<commit_message>
rame4494 Updates to SQL_TESTING & DB_Logic refs
</commit_message>
<xml_diff>
--- a/DB_Logic.pptx
+++ b/DB_Logic.pptx
@@ -7,15 +7,17 @@
   <p:sldIdLst>
     <p:sldId id="256" r:id="rId2"/>
     <p:sldId id="257" r:id="rId3"/>
-    <p:sldId id="262" r:id="rId4"/>
-    <p:sldId id="258" r:id="rId5"/>
-    <p:sldId id="260" r:id="rId6"/>
-    <p:sldId id="263" r:id="rId7"/>
-    <p:sldId id="264" r:id="rId8"/>
-    <p:sldId id="261" r:id="rId9"/>
-    <p:sldId id="265" r:id="rId10"/>
-    <p:sldId id="266" r:id="rId11"/>
-    <p:sldId id="267" r:id="rId12"/>
+    <p:sldId id="268" r:id="rId4"/>
+    <p:sldId id="269" r:id="rId5"/>
+    <p:sldId id="262" r:id="rId6"/>
+    <p:sldId id="258" r:id="rId7"/>
+    <p:sldId id="260" r:id="rId8"/>
+    <p:sldId id="263" r:id="rId9"/>
+    <p:sldId id="264" r:id="rId10"/>
+    <p:sldId id="261" r:id="rId11"/>
+    <p:sldId id="265" r:id="rId12"/>
+    <p:sldId id="266" r:id="rId13"/>
+    <p:sldId id="267" r:id="rId14"/>
   </p:sldIdLst>
   <p:sldSz cx="12192000" cy="6858000"/>
   <p:notesSz cx="6858000" cy="9144000"/>
@@ -285,7 +287,7 @@
           <a:p>
             <a:fld id="{1D61C344-5676-D043-B061-D741C9C7D11C}" type="datetimeFigureOut">
               <a:rPr lang="en-US" smtClean="0"/>
-              <a:t>11/7/25</a:t>
+              <a:t>11/12/25</a:t>
             </a:fld>
             <a:endParaRPr lang="en-US"/>
           </a:p>
@@ -455,7 +457,7 @@
           <a:p>
             <a:fld id="{1D61C344-5676-D043-B061-D741C9C7D11C}" type="datetimeFigureOut">
               <a:rPr lang="en-US" smtClean="0"/>
-              <a:t>11/7/25</a:t>
+              <a:t>11/12/25</a:t>
             </a:fld>
             <a:endParaRPr lang="en-US"/>
           </a:p>
@@ -635,7 +637,7 @@
           <a:p>
             <a:fld id="{1D61C344-5676-D043-B061-D741C9C7D11C}" type="datetimeFigureOut">
               <a:rPr lang="en-US" smtClean="0"/>
-              <a:t>11/7/25</a:t>
+              <a:t>11/12/25</a:t>
             </a:fld>
             <a:endParaRPr lang="en-US"/>
           </a:p>
@@ -805,7 +807,7 @@
           <a:p>
             <a:fld id="{1D61C344-5676-D043-B061-D741C9C7D11C}" type="datetimeFigureOut">
               <a:rPr lang="en-US" smtClean="0"/>
-              <a:t>11/7/25</a:t>
+              <a:t>11/12/25</a:t>
             </a:fld>
             <a:endParaRPr lang="en-US"/>
           </a:p>
@@ -1073,7 +1075,7 @@
           <a:p>
             <a:fld id="{1D61C344-5676-D043-B061-D741C9C7D11C}" type="datetimeFigureOut">
               <a:rPr lang="en-US" smtClean="0"/>
-              <a:t>11/7/25</a:t>
+              <a:t>11/12/25</a:t>
             </a:fld>
             <a:endParaRPr lang="en-US"/>
           </a:p>
@@ -1305,7 +1307,7 @@
           <a:p>
             <a:fld id="{1D61C344-5676-D043-B061-D741C9C7D11C}" type="datetimeFigureOut">
               <a:rPr lang="en-US" smtClean="0"/>
-              <a:t>11/7/25</a:t>
+              <a:t>11/12/25</a:t>
             </a:fld>
             <a:endParaRPr lang="en-US"/>
           </a:p>
@@ -1664,7 +1666,7 @@
           <a:p>
             <a:fld id="{1D61C344-5676-D043-B061-D741C9C7D11C}" type="datetimeFigureOut">
               <a:rPr lang="en-US" smtClean="0"/>
-              <a:t>11/7/25</a:t>
+              <a:t>11/12/25</a:t>
             </a:fld>
             <a:endParaRPr lang="en-US"/>
           </a:p>
@@ -1805,7 +1807,7 @@
           <a:p>
             <a:fld id="{1D61C344-5676-D043-B061-D741C9C7D11C}" type="datetimeFigureOut">
               <a:rPr lang="en-US" smtClean="0"/>
-              <a:t>11/7/25</a:t>
+              <a:t>11/12/25</a:t>
             </a:fld>
             <a:endParaRPr lang="en-US"/>
           </a:p>
@@ -1900,7 +1902,7 @@
           <a:p>
             <a:fld id="{1D61C344-5676-D043-B061-D741C9C7D11C}" type="datetimeFigureOut">
               <a:rPr lang="en-US" smtClean="0"/>
-              <a:t>11/7/25</a:t>
+              <a:t>11/12/25</a:t>
             </a:fld>
             <a:endParaRPr lang="en-US"/>
           </a:p>
@@ -2257,7 +2259,7 @@
           <a:p>
             <a:fld id="{1D61C344-5676-D043-B061-D741C9C7D11C}" type="datetimeFigureOut">
               <a:rPr lang="en-US" smtClean="0"/>
-              <a:t>11/7/25</a:t>
+              <a:t>11/12/25</a:t>
             </a:fld>
             <a:endParaRPr lang="en-US"/>
           </a:p>
@@ -2614,7 +2616,7 @@
           <a:p>
             <a:fld id="{1D61C344-5676-D043-B061-D741C9C7D11C}" type="datetimeFigureOut">
               <a:rPr lang="en-US" smtClean="0"/>
-              <a:t>11/7/25</a:t>
+              <a:t>11/12/25</a:t>
             </a:fld>
             <a:endParaRPr lang="en-US"/>
           </a:p>
@@ -2856,7 +2858,7 @@
           <a:p>
             <a:fld id="{1D61C344-5676-D043-B061-D741C9C7D11C}" type="datetimeFigureOut">
               <a:rPr lang="en-US" smtClean="0"/>
-              <a:t>11/7/25</a:t>
+              <a:t>11/12/25</a:t>
             </a:fld>
             <a:endParaRPr lang="en-US"/>
           </a:p>
@@ -3399,6 +3401,461 @@
           <p:cNvPr id="3" name="Picture 2">
             <a:extLst>
               <a:ext uri="{FF2B5EF4-FFF2-40B4-BE49-F238E27FC236}">
+                <a16:creationId xmlns:a16="http://schemas.microsoft.com/office/drawing/2014/main" id="{6933763D-F2CA-77CA-9679-AEC09E8571CA}"/>
+              </a:ext>
+            </a:extLst>
+          </p:cNvPr>
+          <p:cNvPicPr>
+            <a:picLocks noChangeAspect="1"/>
+          </p:cNvPicPr>
+          <p:nvPr/>
+        </p:nvPicPr>
+        <p:blipFill>
+          <a:blip r:embed="rId2"/>
+          <a:stretch>
+            <a:fillRect/>
+          </a:stretch>
+        </p:blipFill>
+        <p:spPr>
+          <a:xfrm>
+            <a:off x="-1" y="0"/>
+            <a:ext cx="6723529" cy="3429000"/>
+          </a:xfrm>
+          <a:prstGeom prst="rect">
+            <a:avLst/>
+          </a:prstGeom>
+        </p:spPr>
+      </p:pic>
+      <p:sp>
+        <p:nvSpPr>
+          <p:cNvPr id="2" name="TextBox 1">
+            <a:extLst>
+              <a:ext uri="{FF2B5EF4-FFF2-40B4-BE49-F238E27FC236}">
+                <a16:creationId xmlns:a16="http://schemas.microsoft.com/office/drawing/2014/main" id="{6CC3DC18-D1D5-A15B-7E97-9C8FB92C375D}"/>
+              </a:ext>
+            </a:extLst>
+          </p:cNvPr>
+          <p:cNvSpPr txBox="1"/>
+          <p:nvPr/>
+        </p:nvSpPr>
+        <p:spPr>
+          <a:xfrm>
+            <a:off x="0" y="4374890"/>
+            <a:ext cx="7772400" cy="1200329"/>
+          </a:xfrm>
+          <a:prstGeom prst="rect">
+            <a:avLst/>
+          </a:prstGeom>
+          <a:noFill/>
+        </p:spPr>
+        <p:txBody>
+          <a:bodyPr wrap="square" rtlCol="0">
+            <a:spAutoFit/>
+          </a:bodyPr>
+          <a:lstStyle/>
+          <a:p>
+            <a:r>
+              <a:rPr lang="en-US" b="1" dirty="0"/>
+              <a:t>Event: User selects a Question Tile</a:t>
+            </a:r>
+          </a:p>
+          <a:p>
+            <a:pPr marL="285750" indent="-285750">
+              <a:buFont typeface="Arial" panose="020B0604020202020204" pitchFamily="34" charset="0"/>
+              <a:buChar char="•"/>
+            </a:pPr>
+            <a:r>
+              <a:rPr lang="en-US" dirty="0"/>
+              <a:t>Nothing happens to the DB for this specific event; the question, value, and category arrays to populate the board have already been extracted by the backend and passed to the frontend.</a:t>
+            </a:r>
+          </a:p>
+        </p:txBody>
+      </p:sp>
+      <p:pic>
+        <p:nvPicPr>
+          <p:cNvPr id="5" name="Picture 4">
+            <a:extLst>
+              <a:ext uri="{FF2B5EF4-FFF2-40B4-BE49-F238E27FC236}">
+                <a16:creationId xmlns:a16="http://schemas.microsoft.com/office/drawing/2014/main" id="{18C625A1-FBB7-611B-2D98-45F8F45B0119}"/>
+              </a:ext>
+            </a:extLst>
+          </p:cNvPr>
+          <p:cNvPicPr>
+            <a:picLocks noChangeAspect="1"/>
+          </p:cNvPicPr>
+          <p:nvPr/>
+        </p:nvPicPr>
+        <p:blipFill>
+          <a:blip r:embed="rId3"/>
+          <a:stretch>
+            <a:fillRect/>
+          </a:stretch>
+        </p:blipFill>
+        <p:spPr>
+          <a:xfrm>
+            <a:off x="7584512" y="18790"/>
+            <a:ext cx="4572000" cy="4356100"/>
+          </a:xfrm>
+          <a:prstGeom prst="rect">
+            <a:avLst/>
+          </a:prstGeom>
+          <a:ln>
+            <a:solidFill>
+              <a:schemeClr val="tx2"/>
+            </a:solidFill>
+          </a:ln>
+        </p:spPr>
+      </p:pic>
+    </p:spTree>
+    <p:extLst>
+      <p:ext uri="{BB962C8B-B14F-4D97-AF65-F5344CB8AC3E}">
+        <p14:creationId xmlns:p14="http://schemas.microsoft.com/office/powerpoint/2010/main" val="2140912390"/>
+      </p:ext>
+    </p:extLst>
+  </p:cSld>
+  <p:clrMapOvr>
+    <a:masterClrMapping/>
+  </p:clrMapOvr>
+</p:sld>
+</file>
+
+<file path=ppt/slides/slide11.xml><?xml version="1.0" encoding="utf-8"?>
+<p:sld xmlns:a="http://schemas.openxmlformats.org/drawingml/2006/main" xmlns:r="http://schemas.openxmlformats.org/officeDocument/2006/relationships" xmlns:p="http://schemas.openxmlformats.org/presentationml/2006/main">
+  <p:cSld>
+    <p:spTree>
+      <p:nvGrpSpPr>
+        <p:cNvPr id="1" name=""/>
+        <p:cNvGrpSpPr/>
+        <p:nvPr/>
+      </p:nvGrpSpPr>
+      <p:grpSpPr>
+        <a:xfrm>
+          <a:off x="0" y="0"/>
+          <a:ext cx="0" cy="0"/>
+          <a:chOff x="0" y="0"/>
+          <a:chExt cx="0" cy="0"/>
+        </a:xfrm>
+      </p:grpSpPr>
+      <p:pic>
+        <p:nvPicPr>
+          <p:cNvPr id="3" name="Picture 2">
+            <a:extLst>
+              <a:ext uri="{FF2B5EF4-FFF2-40B4-BE49-F238E27FC236}">
+                <a16:creationId xmlns:a16="http://schemas.microsoft.com/office/drawing/2014/main" id="{6F8427B8-85DE-C48F-A8A3-9D28B608A101}"/>
+              </a:ext>
+            </a:extLst>
+          </p:cNvPr>
+          <p:cNvPicPr>
+            <a:picLocks noChangeAspect="1"/>
+          </p:cNvPicPr>
+          <p:nvPr/>
+        </p:nvPicPr>
+        <p:blipFill>
+          <a:blip r:embed="rId2"/>
+          <a:stretch>
+            <a:fillRect/>
+          </a:stretch>
+        </p:blipFill>
+        <p:spPr>
+          <a:xfrm>
+            <a:off x="147484" y="157110"/>
+            <a:ext cx="4688080" cy="3271889"/>
+          </a:xfrm>
+          <a:prstGeom prst="rect">
+            <a:avLst/>
+          </a:prstGeom>
+        </p:spPr>
+      </p:pic>
+      <p:sp>
+        <p:nvSpPr>
+          <p:cNvPr id="5" name="TextBox 4">
+            <a:extLst>
+              <a:ext uri="{FF2B5EF4-FFF2-40B4-BE49-F238E27FC236}">
+                <a16:creationId xmlns:a16="http://schemas.microsoft.com/office/drawing/2014/main" id="{02532B80-8194-B551-3902-B98234A6772A}"/>
+              </a:ext>
+            </a:extLst>
+          </p:cNvPr>
+          <p:cNvSpPr txBox="1"/>
+          <p:nvPr/>
+        </p:nvSpPr>
+        <p:spPr>
+          <a:xfrm>
+            <a:off x="-1" y="4463378"/>
+            <a:ext cx="12192001" cy="2308324"/>
+          </a:xfrm>
+          <a:prstGeom prst="rect">
+            <a:avLst/>
+          </a:prstGeom>
+          <a:noFill/>
+        </p:spPr>
+        <p:txBody>
+          <a:bodyPr wrap="square" rtlCol="0">
+            <a:spAutoFit/>
+          </a:bodyPr>
+          <a:lstStyle/>
+          <a:p>
+            <a:r>
+              <a:rPr lang="en-US" b="1" dirty="0"/>
+              <a:t>Event: User inputs an answer to a specific question</a:t>
+            </a:r>
+          </a:p>
+          <a:p>
+            <a:pPr marL="285750" indent="-285750">
+              <a:buFont typeface="Arial" panose="020B0604020202020204" pitchFamily="34" charset="0"/>
+              <a:buChar char="•"/>
+            </a:pPr>
+            <a:r>
+              <a:rPr lang="en-US" dirty="0"/>
+              <a:t>The backend can pass this answer string to the </a:t>
+            </a:r>
+            <a:r>
+              <a:rPr lang="en-US" dirty="0">
+                <a:solidFill>
+                  <a:srgbClr val="00B050"/>
+                </a:solidFill>
+              </a:rPr>
+              <a:t>AnswerText</a:t>
+            </a:r>
+            <a:r>
+              <a:rPr lang="en-US" dirty="0"/>
+              <a:t> attribute of </a:t>
+            </a:r>
+            <a:r>
+              <a:rPr lang="en-US" dirty="0">
+                <a:solidFill>
+                  <a:srgbClr val="00B0F0"/>
+                </a:solidFill>
+              </a:rPr>
+              <a:t>PlayerAnswer</a:t>
+            </a:r>
+            <a:r>
+              <a:rPr lang="en-US" dirty="0"/>
+              <a:t> where the </a:t>
+            </a:r>
+            <a:r>
+              <a:rPr lang="en-US" dirty="0">
+                <a:solidFill>
+                  <a:srgbClr val="00B050"/>
+                </a:solidFill>
+              </a:rPr>
+              <a:t>PlayerID</a:t>
+            </a:r>
+            <a:r>
+              <a:rPr lang="en-US" dirty="0"/>
+              <a:t>, </a:t>
+            </a:r>
+            <a:r>
+              <a:rPr lang="en-US" dirty="0">
+                <a:solidFill>
+                  <a:srgbClr val="00B050"/>
+                </a:solidFill>
+              </a:rPr>
+              <a:t>GameID</a:t>
+            </a:r>
+            <a:r>
+              <a:rPr lang="en-US" dirty="0"/>
+              <a:t>, and </a:t>
+            </a:r>
+            <a:r>
+              <a:rPr lang="en-US" dirty="0">
+                <a:solidFill>
+                  <a:srgbClr val="00B050"/>
+                </a:solidFill>
+              </a:rPr>
+              <a:t>QuestionID</a:t>
+            </a:r>
+            <a:r>
+              <a:rPr lang="en-US" dirty="0"/>
+              <a:t> match the current game tile.</a:t>
+            </a:r>
+          </a:p>
+          <a:p>
+            <a:pPr marL="285750" indent="-285750">
+              <a:buFont typeface="Arial" panose="020B0604020202020204" pitchFamily="34" charset="0"/>
+              <a:buChar char="•"/>
+            </a:pPr>
+            <a:r>
+              <a:rPr lang="en-US" dirty="0"/>
+              <a:t>This storage feature is probably not essential for the MVP; the two use-cases I envisioned for it are: </a:t>
+            </a:r>
+          </a:p>
+          <a:p>
+            <a:pPr marL="742950" lvl="1" indent="-285750">
+              <a:buFont typeface="Arial" panose="020B0604020202020204" pitchFamily="34" charset="0"/>
+              <a:buChar char="•"/>
+            </a:pPr>
+            <a:r>
+              <a:rPr lang="en-US" dirty="0"/>
+              <a:t>Storing submitted answers in a Durable way to be ACID-compliant with power failures/crashes </a:t>
+            </a:r>
+          </a:p>
+          <a:p>
+            <a:pPr marL="742950" lvl="1" indent="-285750">
+              <a:buFont typeface="Arial" panose="020B0604020202020204" pitchFamily="34" charset="0"/>
+              <a:buChar char="•"/>
+            </a:pPr>
+            <a:r>
+              <a:rPr lang="en-US" dirty="0"/>
+              <a:t>Capturing the kind of data that would be used for internal data analytics/customer service in a real app (e.g., what kinds of correct-</a:t>
+            </a:r>
+            <a:r>
+              <a:rPr lang="en-US" dirty="0" err="1"/>
+              <a:t>ish</a:t>
+            </a:r>
+            <a:r>
+              <a:rPr lang="en-US" dirty="0"/>
+              <a:t> answers is our algorithm scoring as wrong and making customers unhappy? What kinds of questions is essentially nobody getting right, and should we deprioritize these categories for future expansions?)</a:t>
+            </a:r>
+          </a:p>
+        </p:txBody>
+      </p:sp>
+      <p:grpSp>
+        <p:nvGrpSpPr>
+          <p:cNvPr id="2" name="Group 1">
+            <a:extLst>
+              <a:ext uri="{FF2B5EF4-FFF2-40B4-BE49-F238E27FC236}">
+                <a16:creationId xmlns:a16="http://schemas.microsoft.com/office/drawing/2014/main" id="{B0FC4AE1-C55C-E459-BBC5-37C7AA17607B}"/>
+              </a:ext>
+            </a:extLst>
+          </p:cNvPr>
+          <p:cNvGrpSpPr/>
+          <p:nvPr/>
+        </p:nvGrpSpPr>
+        <p:grpSpPr>
+          <a:xfrm>
+            <a:off x="7620000" y="0"/>
+            <a:ext cx="4572000" cy="4356100"/>
+            <a:chOff x="7620000" y="0"/>
+            <a:chExt cx="4572000" cy="4356100"/>
+          </a:xfrm>
+        </p:grpSpPr>
+        <p:pic>
+          <p:nvPicPr>
+            <p:cNvPr id="4" name="Picture 3">
+              <a:extLst>
+                <a:ext uri="{FF2B5EF4-FFF2-40B4-BE49-F238E27FC236}">
+                  <a16:creationId xmlns:a16="http://schemas.microsoft.com/office/drawing/2014/main" id="{64A5D983-1940-FC5C-A1F9-F7B8EA7C3EE7}"/>
+                </a:ext>
+              </a:extLst>
+            </p:cNvPr>
+            <p:cNvPicPr>
+              <a:picLocks noChangeAspect="1"/>
+            </p:cNvPicPr>
+            <p:nvPr/>
+          </p:nvPicPr>
+          <p:blipFill>
+            <a:blip r:embed="rId3"/>
+            <a:stretch>
+              <a:fillRect/>
+            </a:stretch>
+          </p:blipFill>
+          <p:spPr>
+            <a:xfrm>
+              <a:off x="7620000" y="0"/>
+              <a:ext cx="4572000" cy="4356100"/>
+            </a:xfrm>
+            <a:prstGeom prst="rect">
+              <a:avLst/>
+            </a:prstGeom>
+            <a:ln>
+              <a:solidFill>
+                <a:schemeClr val="tx2"/>
+              </a:solidFill>
+            </a:ln>
+          </p:spPr>
+        </p:pic>
+        <p:sp>
+          <p:nvSpPr>
+            <p:cNvPr id="6" name="Rectangle 5">
+              <a:extLst>
+                <a:ext uri="{FF2B5EF4-FFF2-40B4-BE49-F238E27FC236}">
+                  <a16:creationId xmlns:a16="http://schemas.microsoft.com/office/drawing/2014/main" id="{1F9C11ED-8B6B-E736-C67D-A2FE445EFB4B}"/>
+                </a:ext>
+              </a:extLst>
+            </p:cNvPr>
+            <p:cNvSpPr/>
+            <p:nvPr/>
+          </p:nvSpPr>
+          <p:spPr>
+            <a:xfrm>
+              <a:off x="9484898" y="1020543"/>
+              <a:ext cx="1237180" cy="1117974"/>
+            </a:xfrm>
+            <a:prstGeom prst="rect">
+              <a:avLst/>
+            </a:prstGeom>
+            <a:solidFill>
+              <a:schemeClr val="accent1">
+                <a:alpha val="50000"/>
+              </a:schemeClr>
+            </a:solidFill>
+            <a:ln w="28575">
+              <a:solidFill>
+                <a:srgbClr val="FFC000"/>
+              </a:solidFill>
+            </a:ln>
+          </p:spPr>
+          <p:style>
+            <a:lnRef idx="2">
+              <a:schemeClr val="accent1">
+                <a:shade val="15000"/>
+              </a:schemeClr>
+            </a:lnRef>
+            <a:fillRef idx="1">
+              <a:schemeClr val="accent1"/>
+            </a:fillRef>
+            <a:effectRef idx="0">
+              <a:schemeClr val="accent1"/>
+            </a:effectRef>
+            <a:fontRef idx="minor">
+              <a:schemeClr val="lt1"/>
+            </a:fontRef>
+          </p:style>
+          <p:txBody>
+            <a:bodyPr rtlCol="0" anchor="ctr"/>
+            <a:lstStyle/>
+            <a:p>
+              <a:pPr algn="ctr"/>
+              <a:endParaRPr lang="en-US"/>
+            </a:p>
+          </p:txBody>
+        </p:sp>
+      </p:grpSp>
+    </p:spTree>
+    <p:extLst>
+      <p:ext uri="{BB962C8B-B14F-4D97-AF65-F5344CB8AC3E}">
+        <p14:creationId xmlns:p14="http://schemas.microsoft.com/office/powerpoint/2010/main" val="3710249626"/>
+      </p:ext>
+    </p:extLst>
+  </p:cSld>
+  <p:clrMapOvr>
+    <a:masterClrMapping/>
+  </p:clrMapOvr>
+</p:sld>
+</file>
+
+<file path=ppt/slides/slide12.xml><?xml version="1.0" encoding="utf-8"?>
+<p:sld xmlns:a="http://schemas.openxmlformats.org/drawingml/2006/main" xmlns:r="http://schemas.openxmlformats.org/officeDocument/2006/relationships" xmlns:p="http://schemas.openxmlformats.org/presentationml/2006/main">
+  <p:cSld>
+    <p:spTree>
+      <p:nvGrpSpPr>
+        <p:cNvPr id="1" name=""/>
+        <p:cNvGrpSpPr/>
+        <p:nvPr/>
+      </p:nvGrpSpPr>
+      <p:grpSpPr>
+        <a:xfrm>
+          <a:off x="0" y="0"/>
+          <a:ext cx="0" cy="0"/>
+          <a:chOff x="0" y="0"/>
+          <a:chExt cx="0" cy="0"/>
+        </a:xfrm>
+      </p:grpSpPr>
+      <p:pic>
+        <p:nvPicPr>
+          <p:cNvPr id="3" name="Picture 2">
+            <a:extLst>
+              <a:ext uri="{FF2B5EF4-FFF2-40B4-BE49-F238E27FC236}">
                 <a16:creationId xmlns:a16="http://schemas.microsoft.com/office/drawing/2014/main" id="{6A73DE20-5769-A06D-69DF-E08A395033FD}"/>
               </a:ext>
             </a:extLst>
@@ -3424,209 +3881,230 @@
           </a:prstGeom>
         </p:spPr>
       </p:pic>
-      <p:pic>
-        <p:nvPicPr>
-          <p:cNvPr id="4" name="Picture 3">
+      <p:grpSp>
+        <p:nvGrpSpPr>
+          <p:cNvPr id="2" name="Group 1">
             <a:extLst>
               <a:ext uri="{FF2B5EF4-FFF2-40B4-BE49-F238E27FC236}">
-                <a16:creationId xmlns:a16="http://schemas.microsoft.com/office/drawing/2014/main" id="{A30B4755-78C5-48DF-9F5F-E5072764DD1E}"/>
+                <a16:creationId xmlns:a16="http://schemas.microsoft.com/office/drawing/2014/main" id="{9201AFBC-AAC5-57AE-B28A-44BE543D9737}"/>
               </a:ext>
             </a:extLst>
           </p:cNvPr>
-          <p:cNvPicPr>
-            <a:picLocks noChangeAspect="1"/>
-          </p:cNvPicPr>
+          <p:cNvGrpSpPr/>
           <p:nvPr/>
-        </p:nvPicPr>
-        <p:blipFill>
-          <a:blip r:embed="rId3"/>
-          <a:stretch>
-            <a:fillRect/>
-          </a:stretch>
-        </p:blipFill>
-        <p:spPr>
+        </p:nvGrpSpPr>
+        <p:grpSpPr>
           <a:xfrm>
             <a:off x="7620000" y="0"/>
             <a:ext cx="4572000" cy="4356100"/>
+            <a:chOff x="7620000" y="0"/>
+            <a:chExt cx="4572000" cy="4356100"/>
           </a:xfrm>
-          <a:prstGeom prst="rect">
-            <a:avLst/>
-          </a:prstGeom>
-          <a:ln>
+        </p:grpSpPr>
+        <p:pic>
+          <p:nvPicPr>
+            <p:cNvPr id="4" name="Picture 3">
+              <a:extLst>
+                <a:ext uri="{FF2B5EF4-FFF2-40B4-BE49-F238E27FC236}">
+                  <a16:creationId xmlns:a16="http://schemas.microsoft.com/office/drawing/2014/main" id="{A30B4755-78C5-48DF-9F5F-E5072764DD1E}"/>
+                </a:ext>
+              </a:extLst>
+            </p:cNvPr>
+            <p:cNvPicPr>
+              <a:picLocks noChangeAspect="1"/>
+            </p:cNvPicPr>
+            <p:nvPr/>
+          </p:nvPicPr>
+          <p:blipFill>
+            <a:blip r:embed="rId3"/>
+            <a:stretch>
+              <a:fillRect/>
+            </a:stretch>
+          </p:blipFill>
+          <p:spPr>
+            <a:xfrm>
+              <a:off x="7620000" y="0"/>
+              <a:ext cx="4572000" cy="4356100"/>
+            </a:xfrm>
+            <a:prstGeom prst="rect">
+              <a:avLst/>
+            </a:prstGeom>
+            <a:ln>
+              <a:solidFill>
+                <a:schemeClr val="tx2"/>
+              </a:solidFill>
+            </a:ln>
+          </p:spPr>
+        </p:pic>
+        <p:sp>
+          <p:nvSpPr>
+            <p:cNvPr id="5" name="Rectangle 4">
+              <a:extLst>
+                <a:ext uri="{FF2B5EF4-FFF2-40B4-BE49-F238E27FC236}">
+                  <a16:creationId xmlns:a16="http://schemas.microsoft.com/office/drawing/2014/main" id="{22F313B0-0283-79EA-D64C-F86FADB5F67B}"/>
+                </a:ext>
+              </a:extLst>
+            </p:cNvPr>
+            <p:cNvSpPr/>
+            <p:nvPr/>
+          </p:nvSpPr>
+          <p:spPr>
+            <a:xfrm>
+              <a:off x="9484898" y="1020543"/>
+              <a:ext cx="1237180" cy="1117974"/>
+            </a:xfrm>
+            <a:prstGeom prst="rect">
+              <a:avLst/>
+            </a:prstGeom>
             <a:solidFill>
-              <a:schemeClr val="tx2"/>
+              <a:schemeClr val="accent1">
+                <a:alpha val="50000"/>
+              </a:schemeClr>
             </a:solidFill>
-          </a:ln>
-        </p:spPr>
-      </p:pic>
-      <p:sp>
-        <p:nvSpPr>
-          <p:cNvPr id="5" name="Rectangle 4">
-            <a:extLst>
-              <a:ext uri="{FF2B5EF4-FFF2-40B4-BE49-F238E27FC236}">
-                <a16:creationId xmlns:a16="http://schemas.microsoft.com/office/drawing/2014/main" id="{22F313B0-0283-79EA-D64C-F86FADB5F67B}"/>
-              </a:ext>
-            </a:extLst>
-          </p:cNvPr>
-          <p:cNvSpPr/>
-          <p:nvPr/>
-        </p:nvSpPr>
-        <p:spPr>
-          <a:xfrm>
-            <a:off x="9484898" y="1020543"/>
-            <a:ext cx="1237180" cy="1117974"/>
-          </a:xfrm>
-          <a:prstGeom prst="rect">
-            <a:avLst/>
-          </a:prstGeom>
-          <a:solidFill>
-            <a:schemeClr val="accent1">
-              <a:alpha val="50000"/>
-            </a:schemeClr>
-          </a:solidFill>
-          <a:ln w="28575">
+            <a:ln w="28575">
+              <a:solidFill>
+                <a:srgbClr val="FFC000"/>
+              </a:solidFill>
+            </a:ln>
+          </p:spPr>
+          <p:style>
+            <a:lnRef idx="2">
+              <a:schemeClr val="accent1">
+                <a:shade val="15000"/>
+              </a:schemeClr>
+            </a:lnRef>
+            <a:fillRef idx="1">
+              <a:schemeClr val="accent1"/>
+            </a:fillRef>
+            <a:effectRef idx="0">
+              <a:schemeClr val="accent1"/>
+            </a:effectRef>
+            <a:fontRef idx="minor">
+              <a:schemeClr val="lt1"/>
+            </a:fontRef>
+          </p:style>
+          <p:txBody>
+            <a:bodyPr rtlCol="0" anchor="ctr"/>
+            <a:lstStyle/>
+            <a:p>
+              <a:pPr algn="ctr"/>
+              <a:endParaRPr lang="en-US"/>
+            </a:p>
+          </p:txBody>
+        </p:sp>
+        <p:sp>
+          <p:nvSpPr>
+            <p:cNvPr id="6" name="Rectangle 5">
+              <a:extLst>
+                <a:ext uri="{FF2B5EF4-FFF2-40B4-BE49-F238E27FC236}">
+                  <a16:creationId xmlns:a16="http://schemas.microsoft.com/office/drawing/2014/main" id="{168562DC-6779-5C26-2680-41928713FC65}"/>
+                </a:ext>
+              </a:extLst>
+            </p:cNvPr>
+            <p:cNvSpPr/>
+            <p:nvPr/>
+          </p:nvSpPr>
+          <p:spPr>
+            <a:xfrm>
+              <a:off x="7737988" y="2270522"/>
+              <a:ext cx="830825" cy="841388"/>
+            </a:xfrm>
+            <a:prstGeom prst="rect">
+              <a:avLst/>
+            </a:prstGeom>
             <a:solidFill>
-              <a:srgbClr val="FFC000"/>
+              <a:schemeClr val="accent1">
+                <a:alpha val="50000"/>
+              </a:schemeClr>
             </a:solidFill>
-          </a:ln>
-        </p:spPr>
-        <p:style>
-          <a:lnRef idx="2">
-            <a:schemeClr val="accent1">
-              <a:shade val="15000"/>
-            </a:schemeClr>
-          </a:lnRef>
-          <a:fillRef idx="1">
-            <a:schemeClr val="accent1"/>
-          </a:fillRef>
-          <a:effectRef idx="0">
-            <a:schemeClr val="accent1"/>
-          </a:effectRef>
-          <a:fontRef idx="minor">
-            <a:schemeClr val="lt1"/>
-          </a:fontRef>
-        </p:style>
-        <p:txBody>
-          <a:bodyPr rtlCol="0" anchor="ctr"/>
-          <a:lstStyle/>
-          <a:p>
-            <a:pPr algn="ctr"/>
-            <a:endParaRPr lang="en-US"/>
-          </a:p>
-        </p:txBody>
-      </p:sp>
-      <p:sp>
-        <p:nvSpPr>
-          <p:cNvPr id="6" name="Rectangle 5">
-            <a:extLst>
-              <a:ext uri="{FF2B5EF4-FFF2-40B4-BE49-F238E27FC236}">
-                <a16:creationId xmlns:a16="http://schemas.microsoft.com/office/drawing/2014/main" id="{168562DC-6779-5C26-2680-41928713FC65}"/>
-              </a:ext>
-            </a:extLst>
-          </p:cNvPr>
-          <p:cNvSpPr/>
-          <p:nvPr/>
-        </p:nvSpPr>
-        <p:spPr>
-          <a:xfrm>
-            <a:off x="7737988" y="2270522"/>
-            <a:ext cx="830825" cy="841388"/>
-          </a:xfrm>
-          <a:prstGeom prst="rect">
-            <a:avLst/>
-          </a:prstGeom>
-          <a:solidFill>
-            <a:schemeClr val="accent1">
-              <a:alpha val="50000"/>
-            </a:schemeClr>
-          </a:solidFill>
-          <a:ln w="28575">
+            <a:ln w="28575">
+              <a:solidFill>
+                <a:srgbClr val="FFC000"/>
+              </a:solidFill>
+            </a:ln>
+          </p:spPr>
+          <p:style>
+            <a:lnRef idx="2">
+              <a:schemeClr val="accent1">
+                <a:shade val="15000"/>
+              </a:schemeClr>
+            </a:lnRef>
+            <a:fillRef idx="1">
+              <a:schemeClr val="accent1"/>
+            </a:fillRef>
+            <a:effectRef idx="0">
+              <a:schemeClr val="accent1"/>
+            </a:effectRef>
+            <a:fontRef idx="minor">
+              <a:schemeClr val="lt1"/>
+            </a:fontRef>
+          </p:style>
+          <p:txBody>
+            <a:bodyPr rtlCol="0" anchor="ctr"/>
+            <a:lstStyle/>
+            <a:p>
+              <a:pPr algn="ctr"/>
+              <a:endParaRPr lang="en-US"/>
+            </a:p>
+          </p:txBody>
+        </p:sp>
+        <p:sp>
+          <p:nvSpPr>
+            <p:cNvPr id="7" name="Rectangle 6">
+              <a:extLst>
+                <a:ext uri="{FF2B5EF4-FFF2-40B4-BE49-F238E27FC236}">
+                  <a16:creationId xmlns:a16="http://schemas.microsoft.com/office/drawing/2014/main" id="{ED32457D-0CA0-FBBC-C4AF-59381AC0FCF9}"/>
+                </a:ext>
+              </a:extLst>
+            </p:cNvPr>
+            <p:cNvSpPr/>
+            <p:nvPr/>
+          </p:nvSpPr>
+          <p:spPr>
+            <a:xfrm>
+              <a:off x="7620000" y="0"/>
+              <a:ext cx="1052052" cy="1224116"/>
+            </a:xfrm>
+            <a:prstGeom prst="rect">
+              <a:avLst/>
+            </a:prstGeom>
             <a:solidFill>
-              <a:srgbClr val="FFC000"/>
+              <a:schemeClr val="accent1">
+                <a:alpha val="50000"/>
+              </a:schemeClr>
             </a:solidFill>
-          </a:ln>
-        </p:spPr>
-        <p:style>
-          <a:lnRef idx="2">
-            <a:schemeClr val="accent1">
-              <a:shade val="15000"/>
-            </a:schemeClr>
-          </a:lnRef>
-          <a:fillRef idx="1">
-            <a:schemeClr val="accent1"/>
-          </a:fillRef>
-          <a:effectRef idx="0">
-            <a:schemeClr val="accent1"/>
-          </a:effectRef>
-          <a:fontRef idx="minor">
-            <a:schemeClr val="lt1"/>
-          </a:fontRef>
-        </p:style>
-        <p:txBody>
-          <a:bodyPr rtlCol="0" anchor="ctr"/>
-          <a:lstStyle/>
-          <a:p>
-            <a:pPr algn="ctr"/>
-            <a:endParaRPr lang="en-US"/>
-          </a:p>
-        </p:txBody>
-      </p:sp>
-      <p:sp>
-        <p:nvSpPr>
-          <p:cNvPr id="7" name="Rectangle 6">
-            <a:extLst>
-              <a:ext uri="{FF2B5EF4-FFF2-40B4-BE49-F238E27FC236}">
-                <a16:creationId xmlns:a16="http://schemas.microsoft.com/office/drawing/2014/main" id="{ED32457D-0CA0-FBBC-C4AF-59381AC0FCF9}"/>
-              </a:ext>
-            </a:extLst>
-          </p:cNvPr>
-          <p:cNvSpPr/>
-          <p:nvPr/>
-        </p:nvSpPr>
-        <p:spPr>
-          <a:xfrm>
-            <a:off x="7620000" y="0"/>
-            <a:ext cx="1052052" cy="1224116"/>
-          </a:xfrm>
-          <a:prstGeom prst="rect">
-            <a:avLst/>
-          </a:prstGeom>
-          <a:solidFill>
-            <a:schemeClr val="accent1">
-              <a:alpha val="50000"/>
-            </a:schemeClr>
-          </a:solidFill>
-          <a:ln w="28575">
-            <a:solidFill>
-              <a:srgbClr val="FFC000"/>
-            </a:solidFill>
-          </a:ln>
-        </p:spPr>
-        <p:style>
-          <a:lnRef idx="2">
-            <a:schemeClr val="accent1">
-              <a:shade val="15000"/>
-            </a:schemeClr>
-          </a:lnRef>
-          <a:fillRef idx="1">
-            <a:schemeClr val="accent1"/>
-          </a:fillRef>
-          <a:effectRef idx="0">
-            <a:schemeClr val="accent1"/>
-          </a:effectRef>
-          <a:fontRef idx="minor">
-            <a:schemeClr val="lt1"/>
-          </a:fontRef>
-        </p:style>
-        <p:txBody>
-          <a:bodyPr rtlCol="0" anchor="ctr"/>
-          <a:lstStyle/>
-          <a:p>
-            <a:pPr algn="ctr"/>
-            <a:endParaRPr lang="en-US"/>
-          </a:p>
-        </p:txBody>
-      </p:sp>
+            <a:ln w="28575">
+              <a:solidFill>
+                <a:srgbClr val="FFC000"/>
+              </a:solidFill>
+            </a:ln>
+          </p:spPr>
+          <p:style>
+            <a:lnRef idx="2">
+              <a:schemeClr val="accent1">
+                <a:shade val="15000"/>
+              </a:schemeClr>
+            </a:lnRef>
+            <a:fillRef idx="1">
+              <a:schemeClr val="accent1"/>
+            </a:fillRef>
+            <a:effectRef idx="0">
+              <a:schemeClr val="accent1"/>
+            </a:effectRef>
+            <a:fontRef idx="minor">
+              <a:schemeClr val="lt1"/>
+            </a:fontRef>
+          </p:style>
+          <p:txBody>
+            <a:bodyPr rtlCol="0" anchor="ctr"/>
+            <a:lstStyle/>
+            <a:p>
+              <a:pPr algn="ctr"/>
+              <a:endParaRPr lang="en-US"/>
+            </a:p>
+          </p:txBody>
+        </p:sp>
+      </p:grpSp>
       <p:sp>
         <p:nvSpPr>
           <p:cNvPr id="8" name="TextBox 7">
@@ -3873,7 +4351,7 @@
 </p:sld>
 </file>
 
-<file path=ppt/slides/slide11.xml><?xml version="1.0" encoding="utf-8"?>
+<file path=ppt/slides/slide13.xml><?xml version="1.0" encoding="utf-8"?>
 <p:sld xmlns:a="http://schemas.openxmlformats.org/drawingml/2006/main" xmlns:r="http://schemas.openxmlformats.org/officeDocument/2006/relationships" xmlns:p="http://schemas.openxmlformats.org/presentationml/2006/main">
   <p:cSld>
     <p:spTree>
@@ -3920,41 +4398,6 @@
           </a:prstGeom>
         </p:spPr>
       </p:pic>
-      <p:pic>
-        <p:nvPicPr>
-          <p:cNvPr id="4" name="Picture 3">
-            <a:extLst>
-              <a:ext uri="{FF2B5EF4-FFF2-40B4-BE49-F238E27FC236}">
-                <a16:creationId xmlns:a16="http://schemas.microsoft.com/office/drawing/2014/main" id="{087FF7FF-7ECA-E8A1-9C73-1DE4FA285317}"/>
-              </a:ext>
-            </a:extLst>
-          </p:cNvPr>
-          <p:cNvPicPr>
-            <a:picLocks noChangeAspect="1"/>
-          </p:cNvPicPr>
-          <p:nvPr/>
-        </p:nvPicPr>
-        <p:blipFill>
-          <a:blip r:embed="rId3"/>
-          <a:stretch>
-            <a:fillRect/>
-          </a:stretch>
-        </p:blipFill>
-        <p:spPr>
-          <a:xfrm>
-            <a:off x="7561005" y="58992"/>
-            <a:ext cx="4572000" cy="4356100"/>
-          </a:xfrm>
-          <a:prstGeom prst="rect">
-            <a:avLst/>
-          </a:prstGeom>
-          <a:ln>
-            <a:solidFill>
-              <a:schemeClr val="tx2"/>
-            </a:solidFill>
-          </a:ln>
-        </p:spPr>
-      </p:pic>
       <p:sp>
         <p:nvSpPr>
           <p:cNvPr id="5" name="TextBox 4">
@@ -4065,62 +4508,118 @@
           </a:p>
         </p:txBody>
       </p:sp>
-      <p:sp>
-        <p:nvSpPr>
-          <p:cNvPr id="6" name="Rectangle 5">
+      <p:grpSp>
+        <p:nvGrpSpPr>
+          <p:cNvPr id="2" name="Group 1">
             <a:extLst>
               <a:ext uri="{FF2B5EF4-FFF2-40B4-BE49-F238E27FC236}">
-                <a16:creationId xmlns:a16="http://schemas.microsoft.com/office/drawing/2014/main" id="{D1679158-4670-9235-92BC-BF9A7A1569A2}"/>
+                <a16:creationId xmlns:a16="http://schemas.microsoft.com/office/drawing/2014/main" id="{E0FA68E1-2EC4-7260-C2A6-0389DFBF21BD}"/>
               </a:ext>
             </a:extLst>
           </p:cNvPr>
-          <p:cNvSpPr/>
+          <p:cNvGrpSpPr/>
           <p:nvPr/>
-        </p:nvSpPr>
-        <p:spPr>
+        </p:nvGrpSpPr>
+        <p:grpSpPr>
           <a:xfrm>
-            <a:off x="9345561" y="3177152"/>
-            <a:ext cx="1184787" cy="1237939"/>
+            <a:off x="7561005" y="58992"/>
+            <a:ext cx="4572000" cy="4356100"/>
+            <a:chOff x="7561005" y="58992"/>
+            <a:chExt cx="4572000" cy="4356100"/>
           </a:xfrm>
-          <a:prstGeom prst="rect">
-            <a:avLst/>
-          </a:prstGeom>
-          <a:solidFill>
-            <a:schemeClr val="accent1">
-              <a:alpha val="50000"/>
-            </a:schemeClr>
-          </a:solidFill>
-          <a:ln w="28575">
+        </p:grpSpPr>
+        <p:pic>
+          <p:nvPicPr>
+            <p:cNvPr id="4" name="Picture 3">
+              <a:extLst>
+                <a:ext uri="{FF2B5EF4-FFF2-40B4-BE49-F238E27FC236}">
+                  <a16:creationId xmlns:a16="http://schemas.microsoft.com/office/drawing/2014/main" id="{087FF7FF-7ECA-E8A1-9C73-1DE4FA285317}"/>
+                </a:ext>
+              </a:extLst>
+            </p:cNvPr>
+            <p:cNvPicPr>
+              <a:picLocks noChangeAspect="1"/>
+            </p:cNvPicPr>
+            <p:nvPr/>
+          </p:nvPicPr>
+          <p:blipFill>
+            <a:blip r:embed="rId3"/>
+            <a:stretch>
+              <a:fillRect/>
+            </a:stretch>
+          </p:blipFill>
+          <p:spPr>
+            <a:xfrm>
+              <a:off x="7561005" y="58992"/>
+              <a:ext cx="4572000" cy="4356100"/>
+            </a:xfrm>
+            <a:prstGeom prst="rect">
+              <a:avLst/>
+            </a:prstGeom>
+            <a:ln>
+              <a:solidFill>
+                <a:schemeClr val="tx2"/>
+              </a:solidFill>
+            </a:ln>
+          </p:spPr>
+        </p:pic>
+        <p:sp>
+          <p:nvSpPr>
+            <p:cNvPr id="6" name="Rectangle 5">
+              <a:extLst>
+                <a:ext uri="{FF2B5EF4-FFF2-40B4-BE49-F238E27FC236}">
+                  <a16:creationId xmlns:a16="http://schemas.microsoft.com/office/drawing/2014/main" id="{D1679158-4670-9235-92BC-BF9A7A1569A2}"/>
+                </a:ext>
+              </a:extLst>
+            </p:cNvPr>
+            <p:cNvSpPr/>
+            <p:nvPr/>
+          </p:nvSpPr>
+          <p:spPr>
+            <a:xfrm>
+              <a:off x="9345561" y="3177152"/>
+              <a:ext cx="1184787" cy="1237939"/>
+            </a:xfrm>
+            <a:prstGeom prst="rect">
+              <a:avLst/>
+            </a:prstGeom>
             <a:solidFill>
-              <a:srgbClr val="FFC000"/>
+              <a:schemeClr val="accent1">
+                <a:alpha val="50000"/>
+              </a:schemeClr>
             </a:solidFill>
-          </a:ln>
-        </p:spPr>
-        <p:style>
-          <a:lnRef idx="2">
-            <a:schemeClr val="accent1">
-              <a:shade val="15000"/>
-            </a:schemeClr>
-          </a:lnRef>
-          <a:fillRef idx="1">
-            <a:schemeClr val="accent1"/>
-          </a:fillRef>
-          <a:effectRef idx="0">
-            <a:schemeClr val="accent1"/>
-          </a:effectRef>
-          <a:fontRef idx="minor">
-            <a:schemeClr val="lt1"/>
-          </a:fontRef>
-        </p:style>
-        <p:txBody>
-          <a:bodyPr rtlCol="0" anchor="ctr"/>
-          <a:lstStyle/>
-          <a:p>
-            <a:pPr algn="ctr"/>
-            <a:endParaRPr lang="en-US"/>
-          </a:p>
-        </p:txBody>
-      </p:sp>
+            <a:ln w="28575">
+              <a:solidFill>
+                <a:srgbClr val="FFC000"/>
+              </a:solidFill>
+            </a:ln>
+          </p:spPr>
+          <p:style>
+            <a:lnRef idx="2">
+              <a:schemeClr val="accent1">
+                <a:shade val="15000"/>
+              </a:schemeClr>
+            </a:lnRef>
+            <a:fillRef idx="1">
+              <a:schemeClr val="accent1"/>
+            </a:fillRef>
+            <a:effectRef idx="0">
+              <a:schemeClr val="accent1"/>
+            </a:effectRef>
+            <a:fontRef idx="minor">
+              <a:schemeClr val="lt1"/>
+            </a:fontRef>
+          </p:style>
+          <p:txBody>
+            <a:bodyPr rtlCol="0" anchor="ctr"/>
+            <a:lstStyle/>
+            <a:p>
+              <a:pPr algn="ctr"/>
+              <a:endParaRPr lang="en-US"/>
+            </a:p>
+          </p:txBody>
+        </p:sp>
+      </p:grpSp>
     </p:spTree>
     <p:extLst>
       <p:ext uri="{BB962C8B-B14F-4D97-AF65-F5344CB8AC3E}">
@@ -4251,7 +4750,7 @@
         </p:nvSpPr>
         <p:spPr>
           <a:xfrm>
-            <a:off x="675362" y="3450149"/>
+            <a:off x="1855355" y="3875884"/>
             <a:ext cx="638827" cy="576197"/>
           </a:xfrm>
           <a:prstGeom prst="rightArrow">
@@ -4312,6 +4811,529 @@
   <p:cSld>
     <p:spTree>
       <p:nvGrpSpPr>
+        <p:cNvPr id="1" name="">
+          <a:extLst>
+            <a:ext uri="{FF2B5EF4-FFF2-40B4-BE49-F238E27FC236}">
+              <a16:creationId xmlns:a16="http://schemas.microsoft.com/office/drawing/2014/main" id="{A042449D-E79B-9E5F-3555-DE9911E8B9A5}"/>
+            </a:ext>
+          </a:extLst>
+        </p:cNvPr>
+        <p:cNvGrpSpPr/>
+        <p:nvPr/>
+      </p:nvGrpSpPr>
+      <p:grpSpPr>
+        <a:xfrm>
+          <a:off x="0" y="0"/>
+          <a:ext cx="0" cy="0"/>
+          <a:chOff x="0" y="0"/>
+          <a:chExt cx="0" cy="0"/>
+        </a:xfrm>
+      </p:grpSpPr>
+      <p:sp>
+        <p:nvSpPr>
+          <p:cNvPr id="2" name="Title 1">
+            <a:extLst>
+              <a:ext uri="{FF2B5EF4-FFF2-40B4-BE49-F238E27FC236}">
+                <a16:creationId xmlns:a16="http://schemas.microsoft.com/office/drawing/2014/main" id="{2D723DDA-E950-AF2D-615E-2ABF707EFF56}"/>
+              </a:ext>
+            </a:extLst>
+          </p:cNvPr>
+          <p:cNvSpPr>
+            <a:spLocks noGrp="1"/>
+          </p:cNvSpPr>
+          <p:nvPr>
+            <p:ph type="title"/>
+          </p:nvPr>
+        </p:nvSpPr>
+        <p:spPr/>
+        <p:txBody>
+          <a:bodyPr/>
+          <a:lstStyle/>
+          <a:p>
+            <a:r>
+              <a:rPr lang="en-US" dirty="0"/>
+              <a:t>New SQL ERD (v4)</a:t>
+            </a:r>
+          </a:p>
+        </p:txBody>
+      </p:sp>
+      <p:sp>
+        <p:nvSpPr>
+          <p:cNvPr id="3" name="Text Placeholder 2">
+            <a:extLst>
+              <a:ext uri="{FF2B5EF4-FFF2-40B4-BE49-F238E27FC236}">
+                <a16:creationId xmlns:a16="http://schemas.microsoft.com/office/drawing/2014/main" id="{42D5CDF9-80B5-EFE8-853A-BC400F559970}"/>
+              </a:ext>
+            </a:extLst>
+          </p:cNvPr>
+          <p:cNvSpPr>
+            <a:spLocks noGrp="1"/>
+          </p:cNvSpPr>
+          <p:nvPr>
+            <p:ph type="body" idx="1"/>
+          </p:nvPr>
+        </p:nvSpPr>
+        <p:spPr/>
+        <p:txBody>
+          <a:bodyPr/>
+          <a:lstStyle/>
+          <a:p>
+            <a:r>
+              <a:rPr lang="en-US" dirty="0"/>
+              <a:t>Previous designs caused problems because two weak entities (GameQuestion &amp; PlayerAnswer) had a foreign key relationship!</a:t>
+            </a:r>
+          </a:p>
+        </p:txBody>
+      </p:sp>
+    </p:spTree>
+    <p:extLst>
+      <p:ext uri="{BB962C8B-B14F-4D97-AF65-F5344CB8AC3E}">
+        <p14:creationId xmlns:p14="http://schemas.microsoft.com/office/powerpoint/2010/main" val="3322045213"/>
+      </p:ext>
+    </p:extLst>
+  </p:cSld>
+  <p:clrMapOvr>
+    <a:masterClrMapping/>
+  </p:clrMapOvr>
+</p:sld>
+</file>
+
+<file path=ppt/slides/slide4.xml><?xml version="1.0" encoding="utf-8"?>
+<p:sld xmlns:a="http://schemas.openxmlformats.org/drawingml/2006/main" xmlns:r="http://schemas.openxmlformats.org/officeDocument/2006/relationships" xmlns:p="http://schemas.openxmlformats.org/presentationml/2006/main">
+  <p:cSld>
+    <p:spTree>
+      <p:nvGrpSpPr>
+        <p:cNvPr id="1" name=""/>
+        <p:cNvGrpSpPr/>
+        <p:nvPr/>
+      </p:nvGrpSpPr>
+      <p:grpSpPr>
+        <a:xfrm>
+          <a:off x="0" y="0"/>
+          <a:ext cx="0" cy="0"/>
+          <a:chOff x="0" y="0"/>
+          <a:chExt cx="0" cy="0"/>
+        </a:xfrm>
+      </p:grpSpPr>
+      <p:grpSp>
+        <p:nvGrpSpPr>
+          <p:cNvPr id="6" name="Group 5">
+            <a:extLst>
+              <a:ext uri="{FF2B5EF4-FFF2-40B4-BE49-F238E27FC236}">
+                <a16:creationId xmlns:a16="http://schemas.microsoft.com/office/drawing/2014/main" id="{ED531AA0-CB59-2225-F40E-64B4858D21C1}"/>
+              </a:ext>
+            </a:extLst>
+          </p:cNvPr>
+          <p:cNvGrpSpPr/>
+          <p:nvPr/>
+        </p:nvGrpSpPr>
+        <p:grpSpPr>
+          <a:xfrm>
+            <a:off x="112222" y="604896"/>
+            <a:ext cx="11967556" cy="5648207"/>
+            <a:chOff x="0" y="511687"/>
+            <a:chExt cx="12362544" cy="5834626"/>
+          </a:xfrm>
+        </p:grpSpPr>
+        <p:pic>
+          <p:nvPicPr>
+            <p:cNvPr id="3" name="Picture 2">
+              <a:extLst>
+                <a:ext uri="{FF2B5EF4-FFF2-40B4-BE49-F238E27FC236}">
+                  <a16:creationId xmlns:a16="http://schemas.microsoft.com/office/drawing/2014/main" id="{8D65DAF8-92CD-7088-7C6E-EE4AC75CDD14}"/>
+                </a:ext>
+              </a:extLst>
+            </p:cNvPr>
+            <p:cNvPicPr>
+              <a:picLocks noChangeAspect="1"/>
+            </p:cNvPicPr>
+            <p:nvPr/>
+          </p:nvPicPr>
+          <p:blipFill>
+            <a:blip r:embed="rId2"/>
+            <a:stretch>
+              <a:fillRect/>
+            </a:stretch>
+          </p:blipFill>
+          <p:spPr>
+            <a:xfrm>
+              <a:off x="6256541" y="511688"/>
+              <a:ext cx="6106003" cy="5834625"/>
+            </a:xfrm>
+            <a:prstGeom prst="rect">
+              <a:avLst/>
+            </a:prstGeom>
+          </p:spPr>
+        </p:pic>
+        <p:pic>
+          <p:nvPicPr>
+            <p:cNvPr id="5" name="Picture 4">
+              <a:extLst>
+                <a:ext uri="{FF2B5EF4-FFF2-40B4-BE49-F238E27FC236}">
+                  <a16:creationId xmlns:a16="http://schemas.microsoft.com/office/drawing/2014/main" id="{DC9F5090-17AB-2846-7406-8D2F5CCE066D}"/>
+                </a:ext>
+              </a:extLst>
+            </p:cNvPr>
+            <p:cNvPicPr>
+              <a:picLocks noChangeAspect="1"/>
+            </p:cNvPicPr>
+            <p:nvPr/>
+          </p:nvPicPr>
+          <p:blipFill>
+            <a:blip r:embed="rId3"/>
+            <a:stretch>
+              <a:fillRect/>
+            </a:stretch>
+          </p:blipFill>
+          <p:spPr>
+            <a:xfrm>
+              <a:off x="0" y="511687"/>
+              <a:ext cx="6123806" cy="5834626"/>
+            </a:xfrm>
+            <a:prstGeom prst="rect">
+              <a:avLst/>
+            </a:prstGeom>
+          </p:spPr>
+        </p:pic>
+      </p:grpSp>
+      <p:sp>
+        <p:nvSpPr>
+          <p:cNvPr id="7" name="TextBox 6">
+            <a:extLst>
+              <a:ext uri="{FF2B5EF4-FFF2-40B4-BE49-F238E27FC236}">
+                <a16:creationId xmlns:a16="http://schemas.microsoft.com/office/drawing/2014/main" id="{7AEF56DC-8B25-B331-6B46-17EA22AD191A}"/>
+              </a:ext>
+            </a:extLst>
+          </p:cNvPr>
+          <p:cNvSpPr txBox="1"/>
+          <p:nvPr/>
+        </p:nvSpPr>
+        <p:spPr>
+          <a:xfrm>
+            <a:off x="2837288" y="825910"/>
+            <a:ext cx="478016" cy="369332"/>
+          </a:xfrm>
+          <a:prstGeom prst="rect">
+            <a:avLst/>
+          </a:prstGeom>
+          <a:noFill/>
+        </p:spPr>
+        <p:txBody>
+          <a:bodyPr wrap="none" rtlCol="0">
+            <a:spAutoFit/>
+          </a:bodyPr>
+          <a:lstStyle/>
+          <a:p>
+            <a:pPr algn="ctr"/>
+            <a:r>
+              <a:rPr lang="en-US" b="1" dirty="0"/>
+              <a:t>V2</a:t>
+            </a:r>
+          </a:p>
+        </p:txBody>
+      </p:sp>
+      <p:sp>
+        <p:nvSpPr>
+          <p:cNvPr id="8" name="TextBox 7">
+            <a:extLst>
+              <a:ext uri="{FF2B5EF4-FFF2-40B4-BE49-F238E27FC236}">
+                <a16:creationId xmlns:a16="http://schemas.microsoft.com/office/drawing/2014/main" id="{EFE318ED-F16B-8A58-B088-7C6FA766F170}"/>
+              </a:ext>
+            </a:extLst>
+          </p:cNvPr>
+          <p:cNvSpPr txBox="1"/>
+          <p:nvPr/>
+        </p:nvSpPr>
+        <p:spPr>
+          <a:xfrm>
+            <a:off x="8513544" y="825910"/>
+            <a:ext cx="1221553" cy="369332"/>
+          </a:xfrm>
+          <a:prstGeom prst="rect">
+            <a:avLst/>
+          </a:prstGeom>
+          <a:noFill/>
+        </p:spPr>
+        <p:txBody>
+          <a:bodyPr wrap="none" rtlCol="0">
+            <a:spAutoFit/>
+          </a:bodyPr>
+          <a:lstStyle/>
+          <a:p>
+            <a:pPr algn="ctr"/>
+            <a:r>
+              <a:rPr lang="en-US" b="1" dirty="0"/>
+              <a:t>V3 – new!</a:t>
+            </a:r>
+          </a:p>
+        </p:txBody>
+      </p:sp>
+      <p:sp>
+        <p:nvSpPr>
+          <p:cNvPr id="9" name="Rectangle 8">
+            <a:extLst>
+              <a:ext uri="{FF2B5EF4-FFF2-40B4-BE49-F238E27FC236}">
+                <a16:creationId xmlns:a16="http://schemas.microsoft.com/office/drawing/2014/main" id="{B8488D1C-EE7C-32A7-09CE-A72B44595979}"/>
+              </a:ext>
+            </a:extLst>
+          </p:cNvPr>
+          <p:cNvSpPr/>
+          <p:nvPr/>
+        </p:nvSpPr>
+        <p:spPr>
+          <a:xfrm>
+            <a:off x="4041058" y="2123768"/>
+            <a:ext cx="1091381" cy="1305231"/>
+          </a:xfrm>
+          <a:prstGeom prst="rect">
+            <a:avLst/>
+          </a:prstGeom>
+          <a:solidFill>
+            <a:srgbClr val="FF0000">
+              <a:alpha val="50000"/>
+            </a:srgbClr>
+          </a:solidFill>
+          <a:ln>
+            <a:solidFill>
+              <a:schemeClr val="tx2"/>
+            </a:solidFill>
+          </a:ln>
+        </p:spPr>
+        <p:style>
+          <a:lnRef idx="2">
+            <a:schemeClr val="accent1">
+              <a:shade val="15000"/>
+            </a:schemeClr>
+          </a:lnRef>
+          <a:fillRef idx="1">
+            <a:schemeClr val="accent1"/>
+          </a:fillRef>
+          <a:effectRef idx="0">
+            <a:schemeClr val="accent1"/>
+          </a:effectRef>
+          <a:fontRef idx="minor">
+            <a:schemeClr val="lt1"/>
+          </a:fontRef>
+        </p:style>
+        <p:txBody>
+          <a:bodyPr rtlCol="0" anchor="ctr"/>
+          <a:lstStyle/>
+          <a:p>
+            <a:pPr algn="ctr"/>
+            <a:endParaRPr lang="en-US" dirty="0"/>
+          </a:p>
+        </p:txBody>
+      </p:sp>
+      <p:sp>
+        <p:nvSpPr>
+          <p:cNvPr id="10" name="Rectangle 9">
+            <a:extLst>
+              <a:ext uri="{FF2B5EF4-FFF2-40B4-BE49-F238E27FC236}">
+                <a16:creationId xmlns:a16="http://schemas.microsoft.com/office/drawing/2014/main" id="{2A5B29C7-5305-CFD6-9E09-ABC1DB2671E4}"/>
+              </a:ext>
+            </a:extLst>
+          </p:cNvPr>
+          <p:cNvSpPr/>
+          <p:nvPr/>
+        </p:nvSpPr>
+        <p:spPr>
+          <a:xfrm>
+            <a:off x="9969206" y="1195242"/>
+            <a:ext cx="666566" cy="1305231"/>
+          </a:xfrm>
+          <a:prstGeom prst="rect">
+            <a:avLst/>
+          </a:prstGeom>
+          <a:solidFill>
+            <a:srgbClr val="0070C0">
+              <a:alpha val="50000"/>
+            </a:srgbClr>
+          </a:solidFill>
+          <a:ln>
+            <a:solidFill>
+              <a:schemeClr val="tx2"/>
+            </a:solidFill>
+          </a:ln>
+        </p:spPr>
+        <p:style>
+          <a:lnRef idx="2">
+            <a:schemeClr val="accent1">
+              <a:shade val="15000"/>
+            </a:schemeClr>
+          </a:lnRef>
+          <a:fillRef idx="1">
+            <a:schemeClr val="accent1"/>
+          </a:fillRef>
+          <a:effectRef idx="0">
+            <a:schemeClr val="accent1"/>
+          </a:effectRef>
+          <a:fontRef idx="minor">
+            <a:schemeClr val="lt1"/>
+          </a:fontRef>
+        </p:style>
+        <p:txBody>
+          <a:bodyPr rtlCol="0" anchor="ctr"/>
+          <a:lstStyle/>
+          <a:p>
+            <a:pPr algn="ctr"/>
+            <a:endParaRPr lang="en-US" dirty="0"/>
+          </a:p>
+        </p:txBody>
+      </p:sp>
+      <p:sp>
+        <p:nvSpPr>
+          <p:cNvPr id="11" name="Rectangle 10">
+            <a:extLst>
+              <a:ext uri="{FF2B5EF4-FFF2-40B4-BE49-F238E27FC236}">
+                <a16:creationId xmlns:a16="http://schemas.microsoft.com/office/drawing/2014/main" id="{E071F0CA-6BC9-8604-45F2-DDC2C07C1616}"/>
+              </a:ext>
+            </a:extLst>
+          </p:cNvPr>
+          <p:cNvSpPr/>
+          <p:nvPr/>
+        </p:nvSpPr>
+        <p:spPr>
+          <a:xfrm>
+            <a:off x="8976610" y="2912533"/>
+            <a:ext cx="992596" cy="1794934"/>
+          </a:xfrm>
+          <a:prstGeom prst="rect">
+            <a:avLst/>
+          </a:prstGeom>
+          <a:solidFill>
+            <a:srgbClr val="0070C0">
+              <a:alpha val="50000"/>
+            </a:srgbClr>
+          </a:solidFill>
+          <a:ln>
+            <a:solidFill>
+              <a:schemeClr val="tx2"/>
+            </a:solidFill>
+          </a:ln>
+        </p:spPr>
+        <p:style>
+          <a:lnRef idx="2">
+            <a:schemeClr val="accent1">
+              <a:shade val="15000"/>
+            </a:schemeClr>
+          </a:lnRef>
+          <a:fillRef idx="1">
+            <a:schemeClr val="accent1"/>
+          </a:fillRef>
+          <a:effectRef idx="0">
+            <a:schemeClr val="accent1"/>
+          </a:effectRef>
+          <a:fontRef idx="minor">
+            <a:schemeClr val="lt1"/>
+          </a:fontRef>
+        </p:style>
+        <p:txBody>
+          <a:bodyPr rtlCol="0" anchor="ctr"/>
+          <a:lstStyle/>
+          <a:p>
+            <a:pPr algn="ctr"/>
+            <a:endParaRPr lang="en-US" dirty="0"/>
+          </a:p>
+        </p:txBody>
+      </p:sp>
+      <p:sp>
+        <p:nvSpPr>
+          <p:cNvPr id="2" name="TextBox 1">
+            <a:extLst>
+              <a:ext uri="{FF2B5EF4-FFF2-40B4-BE49-F238E27FC236}">
+                <a16:creationId xmlns:a16="http://schemas.microsoft.com/office/drawing/2014/main" id="{FD0EB2D1-CCAC-D410-8AAB-90F5384EBB09}"/>
+              </a:ext>
+            </a:extLst>
+          </p:cNvPr>
+          <p:cNvSpPr txBox="1"/>
+          <p:nvPr/>
+        </p:nvSpPr>
+        <p:spPr>
+          <a:xfrm>
+            <a:off x="4868129" y="125058"/>
+            <a:ext cx="4866968" cy="369332"/>
+          </a:xfrm>
+          <a:prstGeom prst="rect">
+            <a:avLst/>
+          </a:prstGeom>
+          <a:noFill/>
+        </p:spPr>
+        <p:txBody>
+          <a:bodyPr wrap="square" rtlCol="0">
+            <a:spAutoFit/>
+          </a:bodyPr>
+          <a:lstStyle/>
+          <a:p>
+            <a:pPr algn="r"/>
+            <a:r>
+              <a:rPr lang="en-US" b="1" dirty="0"/>
+              <a:t>V4: Added Attribute GameCode</a:t>
+            </a:r>
+          </a:p>
+        </p:txBody>
+      </p:sp>
+      <p:cxnSp>
+        <p:nvCxnSpPr>
+          <p:cNvPr id="12" name="Straight Arrow Connector 11">
+            <a:extLst>
+              <a:ext uri="{FF2B5EF4-FFF2-40B4-BE49-F238E27FC236}">
+                <a16:creationId xmlns:a16="http://schemas.microsoft.com/office/drawing/2014/main" id="{3603673E-DA61-6D8C-EA46-EA0F4C93F71C}"/>
+              </a:ext>
+            </a:extLst>
+          </p:cNvPr>
+          <p:cNvCxnSpPr>
+            <a:stCxn id="2" idx="3"/>
+          </p:cNvCxnSpPr>
+          <p:nvPr/>
+        </p:nvCxnSpPr>
+        <p:spPr>
+          <a:xfrm>
+            <a:off x="9735097" y="309724"/>
+            <a:ext cx="900675" cy="475560"/>
+          </a:xfrm>
+          <a:prstGeom prst="straightConnector1">
+            <a:avLst/>
+          </a:prstGeom>
+          <a:ln w="28575">
+            <a:solidFill>
+              <a:schemeClr val="tx1"/>
+            </a:solidFill>
+            <a:tailEnd type="triangle"/>
+          </a:ln>
+        </p:spPr>
+        <p:style>
+          <a:lnRef idx="1">
+            <a:schemeClr val="accent1"/>
+          </a:lnRef>
+          <a:fillRef idx="0">
+            <a:schemeClr val="accent1"/>
+          </a:fillRef>
+          <a:effectRef idx="0">
+            <a:schemeClr val="accent1"/>
+          </a:effectRef>
+          <a:fontRef idx="minor">
+            <a:schemeClr val="tx1"/>
+          </a:fontRef>
+        </p:style>
+      </p:cxnSp>
+    </p:spTree>
+    <p:extLst>
+      <p:ext uri="{BB962C8B-B14F-4D97-AF65-F5344CB8AC3E}">
+        <p14:creationId xmlns:p14="http://schemas.microsoft.com/office/powerpoint/2010/main" val="3557341961"/>
+      </p:ext>
+    </p:extLst>
+  </p:cSld>
+  <p:clrMapOvr>
+    <a:masterClrMapping/>
+  </p:clrMapOvr>
+</p:sld>
+</file>
+
+<file path=ppt/slides/slide5.xml><?xml version="1.0" encoding="utf-8"?>
+<p:sld xmlns:a="http://schemas.openxmlformats.org/drawingml/2006/main" xmlns:r="http://schemas.openxmlformats.org/officeDocument/2006/relationships" xmlns:p="http://schemas.openxmlformats.org/presentationml/2006/main">
+  <p:cSld>
+    <p:spTree>
+      <p:nvGrpSpPr>
         <p:cNvPr id="1" name=""/>
         <p:cNvGrpSpPr/>
         <p:nvPr/>
@@ -4390,7 +5412,7 @@
 </p:sld>
 </file>
 
-<file path=ppt/slides/slide4.xml><?xml version="1.0" encoding="utf-8"?>
+<file path=ppt/slides/slide6.xml><?xml version="1.0" encoding="utf-8"?>
 <p:sld xmlns:a="http://schemas.openxmlformats.org/drawingml/2006/main" xmlns:r="http://schemas.openxmlformats.org/officeDocument/2006/relationships" xmlns:p="http://schemas.openxmlformats.org/presentationml/2006/main">
   <p:cSld>
     <p:spTree>
@@ -4439,10 +5461,10 @@
       </p:pic>
       <p:grpSp>
         <p:nvGrpSpPr>
-          <p:cNvPr id="7" name="Group 6">
+          <p:cNvPr id="2" name="Group 1">
             <a:extLst>
               <a:ext uri="{FF2B5EF4-FFF2-40B4-BE49-F238E27FC236}">
-                <a16:creationId xmlns:a16="http://schemas.microsoft.com/office/drawing/2014/main" id="{5DC77805-4543-F90F-C833-B113FDB387B9}"/>
+                <a16:creationId xmlns:a16="http://schemas.microsoft.com/office/drawing/2014/main" id="{445E744C-4CCA-6CE2-BC17-1EF45450CE1E}"/>
               </a:ext>
             </a:extLst>
           </p:cNvPr>
@@ -4453,7 +5475,7 @@
           <a:xfrm>
             <a:off x="7519795" y="100208"/>
             <a:ext cx="4572000" cy="4356100"/>
-            <a:chOff x="6906019" y="0"/>
+            <a:chOff x="7519795" y="100208"/>
             <a:chExt cx="4572000" cy="4356100"/>
           </a:xfrm>
         </p:grpSpPr>
@@ -4479,7 +5501,7 @@
           </p:blipFill>
           <p:spPr>
             <a:xfrm>
-              <a:off x="6906019" y="0"/>
+              <a:off x="7519795" y="100208"/>
               <a:ext cx="4572000" cy="4356100"/>
             </a:xfrm>
             <a:prstGeom prst="rect">
@@ -4506,7 +5528,7 @@
           </p:nvSpPr>
           <p:spPr>
             <a:xfrm>
-              <a:off x="6906019" y="0"/>
+              <a:off x="7519795" y="100208"/>
               <a:ext cx="1073060" cy="1265129"/>
             </a:xfrm>
             <a:prstGeom prst="rect">
@@ -4599,7 +5621,31 @@
             </a:pPr>
             <a:r>
               <a:rPr lang="en-US" dirty="0"/>
-              <a:t>If not, INSERT INTO Player (Username)</a:t>
+              <a:t>If not, INSERT INTO </a:t>
+            </a:r>
+            <a:r>
+              <a:rPr lang="en-US" dirty="0">
+                <a:solidFill>
+                  <a:srgbClr val="00B0F0"/>
+                </a:solidFill>
+              </a:rPr>
+              <a:t>Player</a:t>
+            </a:r>
+            <a:r>
+              <a:rPr lang="en-US" dirty="0"/>
+              <a:t> (</a:t>
+            </a:r>
+            <a:r>
+              <a:rPr lang="en-US" dirty="0">
+                <a:solidFill>
+                  <a:srgbClr val="00B050"/>
+                </a:solidFill>
+              </a:rPr>
+              <a:t>UserName</a:t>
+            </a:r>
+            <a:r>
+              <a:rPr lang="en-US" dirty="0"/>
+              <a:t>)</a:t>
             </a:r>
           </a:p>
           <a:p>
@@ -4647,7 +5693,7 @@
 </p:sld>
 </file>
 
-<file path=ppt/slides/slide5.xml><?xml version="1.0" encoding="utf-8"?>
+<file path=ppt/slides/slide7.xml><?xml version="1.0" encoding="utf-8"?>
 <p:sld xmlns:a="http://schemas.openxmlformats.org/drawingml/2006/main" xmlns:r="http://schemas.openxmlformats.org/officeDocument/2006/relationships" xmlns:p="http://schemas.openxmlformats.org/presentationml/2006/main">
   <p:cSld>
     <p:spTree>
@@ -4694,41 +5740,6 @@
           </a:prstGeom>
         </p:spPr>
       </p:pic>
-      <p:pic>
-        <p:nvPicPr>
-          <p:cNvPr id="2" name="Picture 1">
-            <a:extLst>
-              <a:ext uri="{FF2B5EF4-FFF2-40B4-BE49-F238E27FC236}">
-                <a16:creationId xmlns:a16="http://schemas.microsoft.com/office/drawing/2014/main" id="{767BDCDC-F37E-2B52-164F-2CA0A78D74DB}"/>
-              </a:ext>
-            </a:extLst>
-          </p:cNvPr>
-          <p:cNvPicPr>
-            <a:picLocks noChangeAspect="1"/>
-          </p:cNvPicPr>
-          <p:nvPr/>
-        </p:nvPicPr>
-        <p:blipFill>
-          <a:blip r:embed="rId3"/>
-          <a:stretch>
-            <a:fillRect/>
-          </a:stretch>
-        </p:blipFill>
-        <p:spPr>
-          <a:xfrm>
-            <a:off x="6906019" y="0"/>
-            <a:ext cx="4572000" cy="4356100"/>
-          </a:xfrm>
-          <a:prstGeom prst="rect">
-            <a:avLst/>
-          </a:prstGeom>
-          <a:ln>
-            <a:solidFill>
-              <a:schemeClr val="tx2"/>
-            </a:solidFill>
-          </a:ln>
-        </p:spPr>
-      </p:pic>
       <p:sp>
         <p:nvSpPr>
           <p:cNvPr id="4" name="TextBox 3">
@@ -4769,7 +5780,19 @@
             </a:pPr>
             <a:r>
               <a:rPr lang="en-US" dirty="0"/>
-              <a:t>A new row is inserted into Game.</a:t>
+              <a:t>A new row is inserted into </a:t>
+            </a:r>
+            <a:r>
+              <a:rPr lang="en-US" dirty="0">
+                <a:solidFill>
+                  <a:srgbClr val="00B0F0"/>
+                </a:solidFill>
+              </a:rPr>
+              <a:t>Game</a:t>
+            </a:r>
+            <a:r>
+              <a:rPr lang="en-US" dirty="0"/>
+              <a:t>.</a:t>
             </a:r>
           </a:p>
           <a:p>
@@ -4779,7 +5802,43 @@
             </a:pPr>
             <a:r>
               <a:rPr lang="en-US" dirty="0"/>
-              <a:t>A new row is inserted into Contestant where PlayerID is the current player and GameID is the row that was just created above (the default PlayerScore is 0).</a:t>
+              <a:t>A new row is inserted into </a:t>
+            </a:r>
+            <a:r>
+              <a:rPr lang="en-US" dirty="0">
+                <a:solidFill>
+                  <a:srgbClr val="00B0F0"/>
+                </a:solidFill>
+              </a:rPr>
+              <a:t>Contestant</a:t>
+            </a:r>
+            <a:r>
+              <a:rPr lang="en-US" dirty="0"/>
+              <a:t> where </a:t>
+            </a:r>
+            <a:r>
+              <a:rPr lang="en-US" dirty="0">
+                <a:solidFill>
+                  <a:srgbClr val="00B050"/>
+                </a:solidFill>
+              </a:rPr>
+              <a:t>PlayerID</a:t>
+            </a:r>
+            <a:r>
+              <a:rPr lang="en-US" dirty="0"/>
+              <a:t> is the current player and </a:t>
+            </a:r>
+            <a:r>
+              <a:rPr lang="en-US" dirty="0">
+                <a:solidFill>
+                  <a:srgbClr val="00B050"/>
+                </a:solidFill>
+              </a:rPr>
+              <a:t>GameID</a:t>
+            </a:r>
+            <a:r>
+              <a:rPr lang="en-US" dirty="0"/>
+              <a:t> is the row that was just created above (the default PlayerScore is 0).</a:t>
             </a:r>
           </a:p>
           <a:p>
@@ -4789,7 +5848,55 @@
             </a:pPr>
             <a:r>
               <a:rPr lang="en-US" dirty="0"/>
-              <a:t>A set of J, DJ, and FJ questions are queried from Question; each QuestionID gets associated with the GameID created above in a new GameQuestion Row. By default, IsAnswered is ‘N’.</a:t>
+              <a:t>A set of J, DJ, and FJ questions are queried from </a:t>
+            </a:r>
+            <a:r>
+              <a:rPr lang="en-US" dirty="0">
+                <a:solidFill>
+                  <a:srgbClr val="00B0F0"/>
+                </a:solidFill>
+              </a:rPr>
+              <a:t>Question</a:t>
+            </a:r>
+            <a:r>
+              <a:rPr lang="en-US" dirty="0"/>
+              <a:t>; each </a:t>
+            </a:r>
+            <a:r>
+              <a:rPr lang="en-US" dirty="0">
+                <a:solidFill>
+                  <a:srgbClr val="00B050"/>
+                </a:solidFill>
+              </a:rPr>
+              <a:t>QuestionID</a:t>
+            </a:r>
+            <a:r>
+              <a:rPr lang="en-US" dirty="0"/>
+              <a:t> gets associated with the </a:t>
+            </a:r>
+            <a:r>
+              <a:rPr lang="en-US" dirty="0">
+                <a:solidFill>
+                  <a:srgbClr val="00B050"/>
+                </a:solidFill>
+              </a:rPr>
+              <a:t>GameID</a:t>
+            </a:r>
+            <a:r>
+              <a:rPr lang="en-US" dirty="0"/>
+              <a:t> created above in a new </a:t>
+            </a:r>
+            <a:r>
+              <a:rPr lang="en-US" dirty="0">
+                <a:solidFill>
+                  <a:srgbClr val="00B0F0"/>
+                </a:solidFill>
+              </a:rPr>
+              <a:t>GameQuestion</a:t>
+            </a:r>
+            <a:r>
+              <a:rPr lang="en-US" dirty="0"/>
+              <a:t> Row. By default, IsAnswered is ‘N’.</a:t>
             </a:r>
           </a:p>
           <a:p>
@@ -4804,230 +5911,286 @@
           </a:p>
         </p:txBody>
       </p:sp>
-      <p:sp>
-        <p:nvSpPr>
-          <p:cNvPr id="5" name="Rectangle 4">
+      <p:grpSp>
+        <p:nvGrpSpPr>
+          <p:cNvPr id="9" name="Group 8">
             <a:extLst>
               <a:ext uri="{FF2B5EF4-FFF2-40B4-BE49-F238E27FC236}">
-                <a16:creationId xmlns:a16="http://schemas.microsoft.com/office/drawing/2014/main" id="{19D7D0F3-E896-D732-53D6-405971FCFDDB}"/>
+                <a16:creationId xmlns:a16="http://schemas.microsoft.com/office/drawing/2014/main" id="{97956671-36E8-BD2E-20D0-D33902588E3C}"/>
               </a:ext>
             </a:extLst>
           </p:cNvPr>
-          <p:cNvSpPr/>
+          <p:cNvGrpSpPr/>
           <p:nvPr/>
-        </p:nvSpPr>
-        <p:spPr>
+        </p:nvGrpSpPr>
+        <p:grpSpPr>
           <a:xfrm>
-            <a:off x="6989523" y="2279737"/>
-            <a:ext cx="901874" cy="811234"/>
+            <a:off x="6906019" y="0"/>
+            <a:ext cx="4572000" cy="4356100"/>
+            <a:chOff x="6906019" y="0"/>
+            <a:chExt cx="4572000" cy="4356100"/>
           </a:xfrm>
-          <a:prstGeom prst="rect">
-            <a:avLst/>
-          </a:prstGeom>
-          <a:solidFill>
-            <a:schemeClr val="accent1">
-              <a:alpha val="50000"/>
-            </a:schemeClr>
-          </a:solidFill>
-          <a:ln w="28575">
+        </p:grpSpPr>
+        <p:pic>
+          <p:nvPicPr>
+            <p:cNvPr id="2" name="Picture 1">
+              <a:extLst>
+                <a:ext uri="{FF2B5EF4-FFF2-40B4-BE49-F238E27FC236}">
+                  <a16:creationId xmlns:a16="http://schemas.microsoft.com/office/drawing/2014/main" id="{767BDCDC-F37E-2B52-164F-2CA0A78D74DB}"/>
+                </a:ext>
+              </a:extLst>
+            </p:cNvPr>
+            <p:cNvPicPr>
+              <a:picLocks noChangeAspect="1"/>
+            </p:cNvPicPr>
+            <p:nvPr/>
+          </p:nvPicPr>
+          <p:blipFill>
+            <a:blip r:embed="rId3"/>
+            <a:stretch>
+              <a:fillRect/>
+            </a:stretch>
+          </p:blipFill>
+          <p:spPr>
+            <a:xfrm>
+              <a:off x="6906019" y="0"/>
+              <a:ext cx="4572000" cy="4356100"/>
+            </a:xfrm>
+            <a:prstGeom prst="rect">
+              <a:avLst/>
+            </a:prstGeom>
+            <a:ln>
+              <a:solidFill>
+                <a:schemeClr val="tx2"/>
+              </a:solidFill>
+            </a:ln>
+          </p:spPr>
+        </p:pic>
+        <p:sp>
+          <p:nvSpPr>
+            <p:cNvPr id="5" name="Rectangle 4">
+              <a:extLst>
+                <a:ext uri="{FF2B5EF4-FFF2-40B4-BE49-F238E27FC236}">
+                  <a16:creationId xmlns:a16="http://schemas.microsoft.com/office/drawing/2014/main" id="{19D7D0F3-E896-D732-53D6-405971FCFDDB}"/>
+                </a:ext>
+              </a:extLst>
+            </p:cNvPr>
+            <p:cNvSpPr/>
+            <p:nvPr/>
+          </p:nvSpPr>
+          <p:spPr>
+            <a:xfrm>
+              <a:off x="6989523" y="2279737"/>
+              <a:ext cx="901874" cy="811234"/>
+            </a:xfrm>
+            <a:prstGeom prst="rect">
+              <a:avLst/>
+            </a:prstGeom>
             <a:solidFill>
-              <a:srgbClr val="FFC000"/>
+              <a:schemeClr val="accent1">
+                <a:alpha val="50000"/>
+              </a:schemeClr>
             </a:solidFill>
-          </a:ln>
-        </p:spPr>
-        <p:style>
-          <a:lnRef idx="2">
-            <a:schemeClr val="accent1">
-              <a:shade val="15000"/>
-            </a:schemeClr>
-          </a:lnRef>
-          <a:fillRef idx="1">
-            <a:schemeClr val="accent1"/>
-          </a:fillRef>
-          <a:effectRef idx="0">
-            <a:schemeClr val="accent1"/>
-          </a:effectRef>
-          <a:fontRef idx="minor">
-            <a:schemeClr val="lt1"/>
-          </a:fontRef>
-        </p:style>
-        <p:txBody>
-          <a:bodyPr rtlCol="0" anchor="ctr"/>
-          <a:lstStyle/>
-          <a:p>
-            <a:pPr algn="ctr"/>
-            <a:endParaRPr lang="en-US"/>
-          </a:p>
-        </p:txBody>
-      </p:sp>
-      <p:sp>
-        <p:nvSpPr>
-          <p:cNvPr id="6" name="Rectangle 5">
-            <a:extLst>
-              <a:ext uri="{FF2B5EF4-FFF2-40B4-BE49-F238E27FC236}">
-                <a16:creationId xmlns:a16="http://schemas.microsoft.com/office/drawing/2014/main" id="{365E9A96-74F1-4051-0F6B-1C979398C5AB}"/>
-              </a:ext>
-            </a:extLst>
-          </p:cNvPr>
-          <p:cNvSpPr/>
-          <p:nvPr/>
-        </p:nvSpPr>
-        <p:spPr>
-          <a:xfrm>
-            <a:off x="8693063" y="3090971"/>
-            <a:ext cx="1189972" cy="1265129"/>
-          </a:xfrm>
-          <a:prstGeom prst="rect">
-            <a:avLst/>
-          </a:prstGeom>
-          <a:solidFill>
-            <a:schemeClr val="accent1">
-              <a:alpha val="50000"/>
-            </a:schemeClr>
-          </a:solidFill>
-          <a:ln w="28575">
+            <a:ln w="28575">
+              <a:solidFill>
+                <a:srgbClr val="FFC000"/>
+              </a:solidFill>
+            </a:ln>
+          </p:spPr>
+          <p:style>
+            <a:lnRef idx="2">
+              <a:schemeClr val="accent1">
+                <a:shade val="15000"/>
+              </a:schemeClr>
+            </a:lnRef>
+            <a:fillRef idx="1">
+              <a:schemeClr val="accent1"/>
+            </a:fillRef>
+            <a:effectRef idx="0">
+              <a:schemeClr val="accent1"/>
+            </a:effectRef>
+            <a:fontRef idx="minor">
+              <a:schemeClr val="lt1"/>
+            </a:fontRef>
+          </p:style>
+          <p:txBody>
+            <a:bodyPr rtlCol="0" anchor="ctr"/>
+            <a:lstStyle/>
+            <a:p>
+              <a:pPr algn="ctr"/>
+              <a:endParaRPr lang="en-US"/>
+            </a:p>
+          </p:txBody>
+        </p:sp>
+        <p:sp>
+          <p:nvSpPr>
+            <p:cNvPr id="6" name="Rectangle 5">
+              <a:extLst>
+                <a:ext uri="{FF2B5EF4-FFF2-40B4-BE49-F238E27FC236}">
+                  <a16:creationId xmlns:a16="http://schemas.microsoft.com/office/drawing/2014/main" id="{365E9A96-74F1-4051-0F6B-1C979398C5AB}"/>
+                </a:ext>
+              </a:extLst>
+            </p:cNvPr>
+            <p:cNvSpPr/>
+            <p:nvPr/>
+          </p:nvSpPr>
+          <p:spPr>
+            <a:xfrm>
+              <a:off x="8693063" y="3090971"/>
+              <a:ext cx="1189972" cy="1265129"/>
+            </a:xfrm>
+            <a:prstGeom prst="rect">
+              <a:avLst/>
+            </a:prstGeom>
             <a:solidFill>
-              <a:srgbClr val="FFC000"/>
+              <a:schemeClr val="accent1">
+                <a:alpha val="50000"/>
+              </a:schemeClr>
             </a:solidFill>
-          </a:ln>
-        </p:spPr>
-        <p:style>
-          <a:lnRef idx="2">
-            <a:schemeClr val="accent1">
-              <a:shade val="15000"/>
-            </a:schemeClr>
-          </a:lnRef>
-          <a:fillRef idx="1">
-            <a:schemeClr val="accent1"/>
-          </a:fillRef>
-          <a:effectRef idx="0">
-            <a:schemeClr val="accent1"/>
-          </a:effectRef>
-          <a:fontRef idx="minor">
-            <a:schemeClr val="lt1"/>
-          </a:fontRef>
-        </p:style>
-        <p:txBody>
-          <a:bodyPr rtlCol="0" anchor="ctr"/>
-          <a:lstStyle/>
-          <a:p>
-            <a:pPr algn="ctr"/>
-            <a:endParaRPr lang="en-US"/>
-          </a:p>
-        </p:txBody>
-      </p:sp>
-      <p:sp>
-        <p:nvSpPr>
-          <p:cNvPr id="7" name="Rectangle 6">
-            <a:extLst>
-              <a:ext uri="{FF2B5EF4-FFF2-40B4-BE49-F238E27FC236}">
-                <a16:creationId xmlns:a16="http://schemas.microsoft.com/office/drawing/2014/main" id="{190C4252-AC10-CAEE-C009-C08315528423}"/>
-              </a:ext>
-            </a:extLst>
-          </p:cNvPr>
-          <p:cNvSpPr/>
-          <p:nvPr/>
-        </p:nvSpPr>
-        <p:spPr>
-          <a:xfrm>
-            <a:off x="10342329" y="2113768"/>
-            <a:ext cx="1073060" cy="811234"/>
-          </a:xfrm>
-          <a:prstGeom prst="rect">
-            <a:avLst/>
-          </a:prstGeom>
-          <a:solidFill>
-            <a:schemeClr val="accent1">
-              <a:alpha val="50000"/>
-            </a:schemeClr>
-          </a:solidFill>
-          <a:ln w="28575">
+            <a:ln w="28575">
+              <a:solidFill>
+                <a:srgbClr val="FFC000"/>
+              </a:solidFill>
+            </a:ln>
+          </p:spPr>
+          <p:style>
+            <a:lnRef idx="2">
+              <a:schemeClr val="accent1">
+                <a:shade val="15000"/>
+              </a:schemeClr>
+            </a:lnRef>
+            <a:fillRef idx="1">
+              <a:schemeClr val="accent1"/>
+            </a:fillRef>
+            <a:effectRef idx="0">
+              <a:schemeClr val="accent1"/>
+            </a:effectRef>
+            <a:fontRef idx="minor">
+              <a:schemeClr val="lt1"/>
+            </a:fontRef>
+          </p:style>
+          <p:txBody>
+            <a:bodyPr rtlCol="0" anchor="ctr"/>
+            <a:lstStyle/>
+            <a:p>
+              <a:pPr algn="ctr"/>
+              <a:endParaRPr lang="en-US"/>
+            </a:p>
+          </p:txBody>
+        </p:sp>
+        <p:sp>
+          <p:nvSpPr>
+            <p:cNvPr id="7" name="Rectangle 6">
+              <a:extLst>
+                <a:ext uri="{FF2B5EF4-FFF2-40B4-BE49-F238E27FC236}">
+                  <a16:creationId xmlns:a16="http://schemas.microsoft.com/office/drawing/2014/main" id="{190C4252-AC10-CAEE-C009-C08315528423}"/>
+                </a:ext>
+              </a:extLst>
+            </p:cNvPr>
+            <p:cNvSpPr/>
+            <p:nvPr/>
+          </p:nvSpPr>
+          <p:spPr>
+            <a:xfrm>
+              <a:off x="10342329" y="2113768"/>
+              <a:ext cx="1073060" cy="811234"/>
+            </a:xfrm>
+            <a:prstGeom prst="rect">
+              <a:avLst/>
+            </a:prstGeom>
             <a:solidFill>
-              <a:srgbClr val="FFC000"/>
+              <a:schemeClr val="accent1">
+                <a:alpha val="50000"/>
+              </a:schemeClr>
             </a:solidFill>
-          </a:ln>
-        </p:spPr>
-        <p:style>
-          <a:lnRef idx="2">
-            <a:schemeClr val="accent1">
-              <a:shade val="15000"/>
-            </a:schemeClr>
-          </a:lnRef>
-          <a:fillRef idx="1">
-            <a:schemeClr val="accent1"/>
-          </a:fillRef>
-          <a:effectRef idx="0">
-            <a:schemeClr val="accent1"/>
-          </a:effectRef>
-          <a:fontRef idx="minor">
-            <a:schemeClr val="lt1"/>
-          </a:fontRef>
-        </p:style>
-        <p:txBody>
-          <a:bodyPr rtlCol="0" anchor="ctr"/>
-          <a:lstStyle/>
-          <a:p>
-            <a:pPr algn="ctr"/>
-            <a:endParaRPr lang="en-US"/>
-          </a:p>
-        </p:txBody>
-      </p:sp>
-      <p:sp>
-        <p:nvSpPr>
-          <p:cNvPr id="8" name="Rectangle 7">
-            <a:extLst>
-              <a:ext uri="{FF2B5EF4-FFF2-40B4-BE49-F238E27FC236}">
-                <a16:creationId xmlns:a16="http://schemas.microsoft.com/office/drawing/2014/main" id="{E7B871F6-C604-18CF-4270-21A9EC2F998F}"/>
-              </a:ext>
-            </a:extLst>
-          </p:cNvPr>
-          <p:cNvSpPr/>
-          <p:nvPr/>
-        </p:nvSpPr>
-        <p:spPr>
-          <a:xfrm>
-            <a:off x="10296394" y="12526"/>
-            <a:ext cx="1169099" cy="1089764"/>
-          </a:xfrm>
-          <a:prstGeom prst="rect">
-            <a:avLst/>
-          </a:prstGeom>
-          <a:solidFill>
-            <a:schemeClr val="accent1">
-              <a:alpha val="50000"/>
-            </a:schemeClr>
-          </a:solidFill>
-          <a:ln w="28575">
+            <a:ln w="28575">
+              <a:solidFill>
+                <a:srgbClr val="FFC000"/>
+              </a:solidFill>
+            </a:ln>
+          </p:spPr>
+          <p:style>
+            <a:lnRef idx="2">
+              <a:schemeClr val="accent1">
+                <a:shade val="15000"/>
+              </a:schemeClr>
+            </a:lnRef>
+            <a:fillRef idx="1">
+              <a:schemeClr val="accent1"/>
+            </a:fillRef>
+            <a:effectRef idx="0">
+              <a:schemeClr val="accent1"/>
+            </a:effectRef>
+            <a:fontRef idx="minor">
+              <a:schemeClr val="lt1"/>
+            </a:fontRef>
+          </p:style>
+          <p:txBody>
+            <a:bodyPr rtlCol="0" anchor="ctr"/>
+            <a:lstStyle/>
+            <a:p>
+              <a:pPr algn="ctr"/>
+              <a:endParaRPr lang="en-US"/>
+            </a:p>
+          </p:txBody>
+        </p:sp>
+        <p:sp>
+          <p:nvSpPr>
+            <p:cNvPr id="8" name="Rectangle 7">
+              <a:extLst>
+                <a:ext uri="{FF2B5EF4-FFF2-40B4-BE49-F238E27FC236}">
+                  <a16:creationId xmlns:a16="http://schemas.microsoft.com/office/drawing/2014/main" id="{E7B871F6-C604-18CF-4270-21A9EC2F998F}"/>
+                </a:ext>
+              </a:extLst>
+            </p:cNvPr>
+            <p:cNvSpPr/>
+            <p:nvPr/>
+          </p:nvSpPr>
+          <p:spPr>
+            <a:xfrm>
+              <a:off x="10296394" y="12526"/>
+              <a:ext cx="1169099" cy="1089764"/>
+            </a:xfrm>
+            <a:prstGeom prst="rect">
+              <a:avLst/>
+            </a:prstGeom>
             <a:solidFill>
-              <a:srgbClr val="FFC000"/>
+              <a:schemeClr val="accent1">
+                <a:alpha val="50000"/>
+              </a:schemeClr>
             </a:solidFill>
-          </a:ln>
-        </p:spPr>
-        <p:style>
-          <a:lnRef idx="2">
-            <a:schemeClr val="accent1">
-              <a:shade val="15000"/>
-            </a:schemeClr>
-          </a:lnRef>
-          <a:fillRef idx="1">
-            <a:schemeClr val="accent1"/>
-          </a:fillRef>
-          <a:effectRef idx="0">
-            <a:schemeClr val="accent1"/>
-          </a:effectRef>
-          <a:fontRef idx="minor">
-            <a:schemeClr val="lt1"/>
-          </a:fontRef>
-        </p:style>
-        <p:txBody>
-          <a:bodyPr rtlCol="0" anchor="ctr"/>
-          <a:lstStyle/>
-          <a:p>
-            <a:pPr algn="ctr"/>
-            <a:endParaRPr lang="en-US"/>
-          </a:p>
-        </p:txBody>
-      </p:sp>
+            <a:ln w="28575">
+              <a:solidFill>
+                <a:srgbClr val="FFC000"/>
+              </a:solidFill>
+            </a:ln>
+          </p:spPr>
+          <p:style>
+            <a:lnRef idx="2">
+              <a:schemeClr val="accent1">
+                <a:shade val="15000"/>
+              </a:schemeClr>
+            </a:lnRef>
+            <a:fillRef idx="1">
+              <a:schemeClr val="accent1"/>
+            </a:fillRef>
+            <a:effectRef idx="0">
+              <a:schemeClr val="accent1"/>
+            </a:effectRef>
+            <a:fontRef idx="minor">
+              <a:schemeClr val="lt1"/>
+            </a:fontRef>
+          </p:style>
+          <p:txBody>
+            <a:bodyPr rtlCol="0" anchor="ctr"/>
+            <a:lstStyle/>
+            <a:p>
+              <a:pPr algn="ctr"/>
+              <a:endParaRPr lang="en-US"/>
+            </a:p>
+          </p:txBody>
+        </p:sp>
+      </p:grpSp>
     </p:spTree>
     <p:extLst>
       <p:ext uri="{BB962C8B-B14F-4D97-AF65-F5344CB8AC3E}">
@@ -5041,7 +6204,7 @@
 </p:sld>
 </file>
 
-<file path=ppt/slides/slide6.xml><?xml version="1.0" encoding="utf-8"?>
+<file path=ppt/slides/slide8.xml><?xml version="1.0" encoding="utf-8"?>
 <p:sld xmlns:a="http://schemas.openxmlformats.org/drawingml/2006/main" xmlns:r="http://schemas.openxmlformats.org/officeDocument/2006/relationships" xmlns:p="http://schemas.openxmlformats.org/presentationml/2006/main">
   <p:cSld>
     <p:spTree>
@@ -5169,7 +6332,43 @@
             </a:pPr>
             <a:r>
               <a:rPr lang="en-US" dirty="0"/>
-              <a:t>A query is run to SELECT UserName FROM Player ORDER BY HighScore DESC LIMIT 5 to get the top 5 players in descending order. This info is passed to the front end for display.</a:t>
+              <a:t>A query is run to SELECT </a:t>
+            </a:r>
+            <a:r>
+              <a:rPr lang="en-US" dirty="0">
+                <a:solidFill>
+                  <a:srgbClr val="00B050"/>
+                </a:solidFill>
+              </a:rPr>
+              <a:t>UserName</a:t>
+            </a:r>
+            <a:r>
+              <a:rPr lang="en-US" dirty="0"/>
+              <a:t> FROM </a:t>
+            </a:r>
+            <a:r>
+              <a:rPr lang="en-US" dirty="0">
+                <a:solidFill>
+                  <a:srgbClr val="00B0F0"/>
+                </a:solidFill>
+              </a:rPr>
+              <a:t>Player</a:t>
+            </a:r>
+            <a:r>
+              <a:rPr lang="en-US" dirty="0"/>
+              <a:t> ORDER BY </a:t>
+            </a:r>
+            <a:r>
+              <a:rPr lang="en-US" dirty="0">
+                <a:solidFill>
+                  <a:srgbClr val="00B050"/>
+                </a:solidFill>
+              </a:rPr>
+              <a:t>HighScore</a:t>
+            </a:r>
+            <a:r>
+              <a:rPr lang="en-US" dirty="0"/>
+              <a:t> DESC LIMIT 5 to get the top 5 players in descending order. This info is passed to the front end for display.</a:t>
             </a:r>
           </a:p>
         </p:txBody>
@@ -5273,7 +6472,7 @@
 </p:sld>
 </file>
 
-<file path=ppt/slides/slide7.xml><?xml version="1.0" encoding="utf-8"?>
+<file path=ppt/slides/slide9.xml><?xml version="1.0" encoding="utf-8"?>
 <p:sld xmlns:a="http://schemas.openxmlformats.org/drawingml/2006/main" xmlns:r="http://schemas.openxmlformats.org/officeDocument/2006/relationships" xmlns:p="http://schemas.openxmlformats.org/presentationml/2006/main">
   <p:cSld>
     <p:spTree>
@@ -5410,440 +6609,6 @@
     <p:extLst>
       <p:ext uri="{BB962C8B-B14F-4D97-AF65-F5344CB8AC3E}">
         <p14:creationId xmlns:p14="http://schemas.microsoft.com/office/powerpoint/2010/main" val="3690738605"/>
-      </p:ext>
-    </p:extLst>
-  </p:cSld>
-  <p:clrMapOvr>
-    <a:masterClrMapping/>
-  </p:clrMapOvr>
-</p:sld>
-</file>
-
-<file path=ppt/slides/slide8.xml><?xml version="1.0" encoding="utf-8"?>
-<p:sld xmlns:a="http://schemas.openxmlformats.org/drawingml/2006/main" xmlns:r="http://schemas.openxmlformats.org/officeDocument/2006/relationships" xmlns:p="http://schemas.openxmlformats.org/presentationml/2006/main">
-  <p:cSld>
-    <p:spTree>
-      <p:nvGrpSpPr>
-        <p:cNvPr id="1" name=""/>
-        <p:cNvGrpSpPr/>
-        <p:nvPr/>
-      </p:nvGrpSpPr>
-      <p:grpSpPr>
-        <a:xfrm>
-          <a:off x="0" y="0"/>
-          <a:ext cx="0" cy="0"/>
-          <a:chOff x="0" y="0"/>
-          <a:chExt cx="0" cy="0"/>
-        </a:xfrm>
-      </p:grpSpPr>
-      <p:pic>
-        <p:nvPicPr>
-          <p:cNvPr id="3" name="Picture 2">
-            <a:extLst>
-              <a:ext uri="{FF2B5EF4-FFF2-40B4-BE49-F238E27FC236}">
-                <a16:creationId xmlns:a16="http://schemas.microsoft.com/office/drawing/2014/main" id="{6933763D-F2CA-77CA-9679-AEC09E8571CA}"/>
-              </a:ext>
-            </a:extLst>
-          </p:cNvPr>
-          <p:cNvPicPr>
-            <a:picLocks noChangeAspect="1"/>
-          </p:cNvPicPr>
-          <p:nvPr/>
-        </p:nvPicPr>
-        <p:blipFill>
-          <a:blip r:embed="rId2"/>
-          <a:stretch>
-            <a:fillRect/>
-          </a:stretch>
-        </p:blipFill>
-        <p:spPr>
-          <a:xfrm>
-            <a:off x="-1" y="0"/>
-            <a:ext cx="6723529" cy="3429000"/>
-          </a:xfrm>
-          <a:prstGeom prst="rect">
-            <a:avLst/>
-          </a:prstGeom>
-        </p:spPr>
-      </p:pic>
-      <p:sp>
-        <p:nvSpPr>
-          <p:cNvPr id="2" name="TextBox 1">
-            <a:extLst>
-              <a:ext uri="{FF2B5EF4-FFF2-40B4-BE49-F238E27FC236}">
-                <a16:creationId xmlns:a16="http://schemas.microsoft.com/office/drawing/2014/main" id="{6CC3DC18-D1D5-A15B-7E97-9C8FB92C375D}"/>
-              </a:ext>
-            </a:extLst>
-          </p:cNvPr>
-          <p:cNvSpPr txBox="1"/>
-          <p:nvPr/>
-        </p:nvSpPr>
-        <p:spPr>
-          <a:xfrm>
-            <a:off x="0" y="4374890"/>
-            <a:ext cx="7772400" cy="1200329"/>
-          </a:xfrm>
-          <a:prstGeom prst="rect">
-            <a:avLst/>
-          </a:prstGeom>
-          <a:noFill/>
-        </p:spPr>
-        <p:txBody>
-          <a:bodyPr wrap="square" rtlCol="0">
-            <a:spAutoFit/>
-          </a:bodyPr>
-          <a:lstStyle/>
-          <a:p>
-            <a:r>
-              <a:rPr lang="en-US" b="1" dirty="0"/>
-              <a:t>Event: User selects a Question Tile</a:t>
-            </a:r>
-          </a:p>
-          <a:p>
-            <a:pPr marL="285750" indent="-285750">
-              <a:buFont typeface="Arial" panose="020B0604020202020204" pitchFamily="34" charset="0"/>
-              <a:buChar char="•"/>
-            </a:pPr>
-            <a:r>
-              <a:rPr lang="en-US" dirty="0"/>
-              <a:t>Nothing happens to the DB for this specific event; the question, value, and category arrays to populate the board have already been extracted by the backend and passed to the frontend.</a:t>
-            </a:r>
-          </a:p>
-        </p:txBody>
-      </p:sp>
-      <p:pic>
-        <p:nvPicPr>
-          <p:cNvPr id="5" name="Picture 4">
-            <a:extLst>
-              <a:ext uri="{FF2B5EF4-FFF2-40B4-BE49-F238E27FC236}">
-                <a16:creationId xmlns:a16="http://schemas.microsoft.com/office/drawing/2014/main" id="{18C625A1-FBB7-611B-2D98-45F8F45B0119}"/>
-              </a:ext>
-            </a:extLst>
-          </p:cNvPr>
-          <p:cNvPicPr>
-            <a:picLocks noChangeAspect="1"/>
-          </p:cNvPicPr>
-          <p:nvPr/>
-        </p:nvPicPr>
-        <p:blipFill>
-          <a:blip r:embed="rId3"/>
-          <a:stretch>
-            <a:fillRect/>
-          </a:stretch>
-        </p:blipFill>
-        <p:spPr>
-          <a:xfrm>
-            <a:off x="7584512" y="18790"/>
-            <a:ext cx="4572000" cy="4356100"/>
-          </a:xfrm>
-          <a:prstGeom prst="rect">
-            <a:avLst/>
-          </a:prstGeom>
-          <a:ln>
-            <a:solidFill>
-              <a:schemeClr val="tx2"/>
-            </a:solidFill>
-          </a:ln>
-        </p:spPr>
-      </p:pic>
-    </p:spTree>
-    <p:extLst>
-      <p:ext uri="{BB962C8B-B14F-4D97-AF65-F5344CB8AC3E}">
-        <p14:creationId xmlns:p14="http://schemas.microsoft.com/office/powerpoint/2010/main" val="2140912390"/>
-      </p:ext>
-    </p:extLst>
-  </p:cSld>
-  <p:clrMapOvr>
-    <a:masterClrMapping/>
-  </p:clrMapOvr>
-</p:sld>
-</file>
-
-<file path=ppt/slides/slide9.xml><?xml version="1.0" encoding="utf-8"?>
-<p:sld xmlns:a="http://schemas.openxmlformats.org/drawingml/2006/main" xmlns:r="http://schemas.openxmlformats.org/officeDocument/2006/relationships" xmlns:p="http://schemas.openxmlformats.org/presentationml/2006/main">
-  <p:cSld>
-    <p:spTree>
-      <p:nvGrpSpPr>
-        <p:cNvPr id="1" name=""/>
-        <p:cNvGrpSpPr/>
-        <p:nvPr/>
-      </p:nvGrpSpPr>
-      <p:grpSpPr>
-        <a:xfrm>
-          <a:off x="0" y="0"/>
-          <a:ext cx="0" cy="0"/>
-          <a:chOff x="0" y="0"/>
-          <a:chExt cx="0" cy="0"/>
-        </a:xfrm>
-      </p:grpSpPr>
-      <p:pic>
-        <p:nvPicPr>
-          <p:cNvPr id="3" name="Picture 2">
-            <a:extLst>
-              <a:ext uri="{FF2B5EF4-FFF2-40B4-BE49-F238E27FC236}">
-                <a16:creationId xmlns:a16="http://schemas.microsoft.com/office/drawing/2014/main" id="{6F8427B8-85DE-C48F-A8A3-9D28B608A101}"/>
-              </a:ext>
-            </a:extLst>
-          </p:cNvPr>
-          <p:cNvPicPr>
-            <a:picLocks noChangeAspect="1"/>
-          </p:cNvPicPr>
-          <p:nvPr/>
-        </p:nvPicPr>
-        <p:blipFill>
-          <a:blip r:embed="rId2"/>
-          <a:stretch>
-            <a:fillRect/>
-          </a:stretch>
-        </p:blipFill>
-        <p:spPr>
-          <a:xfrm>
-            <a:off x="147484" y="157110"/>
-            <a:ext cx="4688080" cy="3271889"/>
-          </a:xfrm>
-          <a:prstGeom prst="rect">
-            <a:avLst/>
-          </a:prstGeom>
-        </p:spPr>
-      </p:pic>
-      <p:pic>
-        <p:nvPicPr>
-          <p:cNvPr id="4" name="Picture 3">
-            <a:extLst>
-              <a:ext uri="{FF2B5EF4-FFF2-40B4-BE49-F238E27FC236}">
-                <a16:creationId xmlns:a16="http://schemas.microsoft.com/office/drawing/2014/main" id="{64A5D983-1940-FC5C-A1F9-F7B8EA7C3EE7}"/>
-              </a:ext>
-            </a:extLst>
-          </p:cNvPr>
-          <p:cNvPicPr>
-            <a:picLocks noChangeAspect="1"/>
-          </p:cNvPicPr>
-          <p:nvPr/>
-        </p:nvPicPr>
-        <p:blipFill>
-          <a:blip r:embed="rId3"/>
-          <a:stretch>
-            <a:fillRect/>
-          </a:stretch>
-        </p:blipFill>
-        <p:spPr>
-          <a:xfrm>
-            <a:off x="7620000" y="0"/>
-            <a:ext cx="4572000" cy="4356100"/>
-          </a:xfrm>
-          <a:prstGeom prst="rect">
-            <a:avLst/>
-          </a:prstGeom>
-          <a:ln>
-            <a:solidFill>
-              <a:schemeClr val="tx2"/>
-            </a:solidFill>
-          </a:ln>
-        </p:spPr>
-      </p:pic>
-      <p:sp>
-        <p:nvSpPr>
-          <p:cNvPr id="5" name="TextBox 4">
-            <a:extLst>
-              <a:ext uri="{FF2B5EF4-FFF2-40B4-BE49-F238E27FC236}">
-                <a16:creationId xmlns:a16="http://schemas.microsoft.com/office/drawing/2014/main" id="{02532B80-8194-B551-3902-B98234A6772A}"/>
-              </a:ext>
-            </a:extLst>
-          </p:cNvPr>
-          <p:cNvSpPr txBox="1"/>
-          <p:nvPr/>
-        </p:nvSpPr>
-        <p:spPr>
-          <a:xfrm>
-            <a:off x="-1" y="4463378"/>
-            <a:ext cx="12192001" cy="2308324"/>
-          </a:xfrm>
-          <a:prstGeom prst="rect">
-            <a:avLst/>
-          </a:prstGeom>
-          <a:noFill/>
-        </p:spPr>
-        <p:txBody>
-          <a:bodyPr wrap="square" rtlCol="0">
-            <a:spAutoFit/>
-          </a:bodyPr>
-          <a:lstStyle/>
-          <a:p>
-            <a:r>
-              <a:rPr lang="en-US" b="1" dirty="0"/>
-              <a:t>Event: User inputs an answer to a specific question</a:t>
-            </a:r>
-          </a:p>
-          <a:p>
-            <a:pPr marL="285750" indent="-285750">
-              <a:buFont typeface="Arial" panose="020B0604020202020204" pitchFamily="34" charset="0"/>
-              <a:buChar char="•"/>
-            </a:pPr>
-            <a:r>
-              <a:rPr lang="en-US" dirty="0"/>
-              <a:t>The backend can pass this answer string to the </a:t>
-            </a:r>
-            <a:r>
-              <a:rPr lang="en-US" dirty="0">
-                <a:solidFill>
-                  <a:srgbClr val="00B050"/>
-                </a:solidFill>
-              </a:rPr>
-              <a:t>AnswerText</a:t>
-            </a:r>
-            <a:r>
-              <a:rPr lang="en-US" dirty="0"/>
-              <a:t> attribute of </a:t>
-            </a:r>
-            <a:r>
-              <a:rPr lang="en-US" dirty="0">
-                <a:solidFill>
-                  <a:srgbClr val="00B0F0"/>
-                </a:solidFill>
-              </a:rPr>
-              <a:t>PlayerAnswer</a:t>
-            </a:r>
-            <a:r>
-              <a:rPr lang="en-US" dirty="0"/>
-              <a:t> where the </a:t>
-            </a:r>
-            <a:r>
-              <a:rPr lang="en-US" dirty="0">
-                <a:solidFill>
-                  <a:srgbClr val="00B050"/>
-                </a:solidFill>
-              </a:rPr>
-              <a:t>PlayerID</a:t>
-            </a:r>
-            <a:r>
-              <a:rPr lang="en-US" dirty="0"/>
-              <a:t>, </a:t>
-            </a:r>
-            <a:r>
-              <a:rPr lang="en-US" dirty="0">
-                <a:solidFill>
-                  <a:srgbClr val="00B050"/>
-                </a:solidFill>
-              </a:rPr>
-              <a:t>GameID</a:t>
-            </a:r>
-            <a:r>
-              <a:rPr lang="en-US" dirty="0"/>
-              <a:t>, and </a:t>
-            </a:r>
-            <a:r>
-              <a:rPr lang="en-US" dirty="0">
-                <a:solidFill>
-                  <a:srgbClr val="00B050"/>
-                </a:solidFill>
-              </a:rPr>
-              <a:t>QuestionID</a:t>
-            </a:r>
-            <a:r>
-              <a:rPr lang="en-US" dirty="0"/>
-              <a:t> match the current game tile.</a:t>
-            </a:r>
-          </a:p>
-          <a:p>
-            <a:pPr marL="285750" indent="-285750">
-              <a:buFont typeface="Arial" panose="020B0604020202020204" pitchFamily="34" charset="0"/>
-              <a:buChar char="•"/>
-            </a:pPr>
-            <a:r>
-              <a:rPr lang="en-US" dirty="0"/>
-              <a:t>This storage feature is probably not essential for the MVP; the two use-cases I envisioned for it are: </a:t>
-            </a:r>
-          </a:p>
-          <a:p>
-            <a:pPr marL="742950" lvl="1" indent="-285750">
-              <a:buFont typeface="Arial" panose="020B0604020202020204" pitchFamily="34" charset="0"/>
-              <a:buChar char="•"/>
-            </a:pPr>
-            <a:r>
-              <a:rPr lang="en-US" dirty="0"/>
-              <a:t>Storing submitted answers in a Durable way to be ACID-compliant with power failures/crashes </a:t>
-            </a:r>
-          </a:p>
-          <a:p>
-            <a:pPr marL="742950" lvl="1" indent="-285750">
-              <a:buFont typeface="Arial" panose="020B0604020202020204" pitchFamily="34" charset="0"/>
-              <a:buChar char="•"/>
-            </a:pPr>
-            <a:r>
-              <a:rPr lang="en-US" dirty="0"/>
-              <a:t>Capturing the kind of data that would be used for internal data analytics/customer service in a real app (e.g., what kinds of correct-</a:t>
-            </a:r>
-            <a:r>
-              <a:rPr lang="en-US" dirty="0" err="1"/>
-              <a:t>ish</a:t>
-            </a:r>
-            <a:r>
-              <a:rPr lang="en-US" dirty="0"/>
-              <a:t> answers is our algorithm scoring as wrong and making customers unhappy? What kinds of questions is essentially nobody getting right, and should we deprioritize these categories for future expansions?)</a:t>
-            </a:r>
-          </a:p>
-        </p:txBody>
-      </p:sp>
-      <p:sp>
-        <p:nvSpPr>
-          <p:cNvPr id="6" name="Rectangle 5">
-            <a:extLst>
-              <a:ext uri="{FF2B5EF4-FFF2-40B4-BE49-F238E27FC236}">
-                <a16:creationId xmlns:a16="http://schemas.microsoft.com/office/drawing/2014/main" id="{1F9C11ED-8B6B-E736-C67D-A2FE445EFB4B}"/>
-              </a:ext>
-            </a:extLst>
-          </p:cNvPr>
-          <p:cNvSpPr/>
-          <p:nvPr/>
-        </p:nvSpPr>
-        <p:spPr>
-          <a:xfrm>
-            <a:off x="9484898" y="1020543"/>
-            <a:ext cx="1237180" cy="1117974"/>
-          </a:xfrm>
-          <a:prstGeom prst="rect">
-            <a:avLst/>
-          </a:prstGeom>
-          <a:solidFill>
-            <a:schemeClr val="accent1">
-              <a:alpha val="50000"/>
-            </a:schemeClr>
-          </a:solidFill>
-          <a:ln w="28575">
-            <a:solidFill>
-              <a:srgbClr val="FFC000"/>
-            </a:solidFill>
-          </a:ln>
-        </p:spPr>
-        <p:style>
-          <a:lnRef idx="2">
-            <a:schemeClr val="accent1">
-              <a:shade val="15000"/>
-            </a:schemeClr>
-          </a:lnRef>
-          <a:fillRef idx="1">
-            <a:schemeClr val="accent1"/>
-          </a:fillRef>
-          <a:effectRef idx="0">
-            <a:schemeClr val="accent1"/>
-          </a:effectRef>
-          <a:fontRef idx="minor">
-            <a:schemeClr val="lt1"/>
-          </a:fontRef>
-        </p:style>
-        <p:txBody>
-          <a:bodyPr rtlCol="0" anchor="ctr"/>
-          <a:lstStyle/>
-          <a:p>
-            <a:pPr algn="ctr"/>
-            <a:endParaRPr lang="en-US"/>
-          </a:p>
-        </p:txBody>
-      </p:sp>
-    </p:spTree>
-    <p:extLst>
-      <p:ext uri="{BB962C8B-B14F-4D97-AF65-F5344CB8AC3E}">
-        <p14:creationId xmlns:p14="http://schemas.microsoft.com/office/powerpoint/2010/main" val="3710249626"/>
       </p:ext>
     </p:extLst>
   </p:cSld>

</xml_diff>